<commit_message>
Code after predicate review
</commit_message>
<xml_diff>
--- a/Day to Day/W04_(Feb 2+4)/W04_Some_Somewhat_usefull_IO_stuff.pptx
+++ b/Day to Day/W04_(Feb 2+4)/W04_Some_Somewhat_usefull_IO_stuff.pptx
@@ -151,7 +151,7 @@
   </p:defaultTextStyle>
   <p:extLst>
     <p:ext uri="{EFAFB233-063F-42B5-8137-9DF3F51BA10A}">
-      <p15:sldGuideLst xmlns="" xmlns:p15="http://schemas.microsoft.com/office/powerpoint/2012/main">
+      <p15:sldGuideLst xmlns:p15="http://schemas.microsoft.com/office/powerpoint/2012/main">
         <p15:guide id="1" orient="horz" pos="2160">
           <p15:clr>
             <a:srgbClr val="A4A3A4"/>
@@ -173,7 +173,7 @@
   <p:cmAuthor id="1" name="Mfeeney" initials="M" lastIdx="1" clrIdx="0">
     <p:extLst>
       <p:ext uri="{19B8F6BF-5375-455C-9EA6-DF929625EA0E}">
-        <p15:presenceInfo xmlns="" xmlns:p15="http://schemas.microsoft.com/office/powerpoint/2012/main" userId="Mfeeney" providerId="None"/>
+        <p15:presenceInfo xmlns:p15="http://schemas.microsoft.com/office/powerpoint/2012/main" userId="Mfeeney" providerId="None"/>
       </p:ext>
     </p:extLst>
   </p:cmAuthor>
@@ -712,7 +712,7 @@
     </p:spTree>
     <p:extLst>
       <p:ext uri="{BB962C8B-B14F-4D97-AF65-F5344CB8AC3E}">
-        <p14:creationId xmlns="" xmlns:p14="http://schemas.microsoft.com/office/powerpoint/2010/main" val="3107681668"/>
+        <p14:creationId xmlns:p14="http://schemas.microsoft.com/office/powerpoint/2010/main" val="3107681668"/>
       </p:ext>
     </p:extLst>
   </p:cSld>
@@ -884,7 +884,7 @@
     </p:spTree>
     <p:extLst>
       <p:ext uri="{BB962C8B-B14F-4D97-AF65-F5344CB8AC3E}">
-        <p14:creationId xmlns="" xmlns:p14="http://schemas.microsoft.com/office/powerpoint/2010/main" val="3647384181"/>
+        <p14:creationId xmlns:p14="http://schemas.microsoft.com/office/powerpoint/2010/main" val="3647384181"/>
       </p:ext>
     </p:extLst>
   </p:cSld>
@@ -1066,7 +1066,7 @@
     </p:spTree>
     <p:extLst>
       <p:ext uri="{BB962C8B-B14F-4D97-AF65-F5344CB8AC3E}">
-        <p14:creationId xmlns="" xmlns:p14="http://schemas.microsoft.com/office/powerpoint/2010/main" val="2792830750"/>
+        <p14:creationId xmlns:p14="http://schemas.microsoft.com/office/powerpoint/2010/main" val="2792830750"/>
       </p:ext>
     </p:extLst>
   </p:cSld>
@@ -1238,7 +1238,7 @@
     </p:spTree>
     <p:extLst>
       <p:ext uri="{BB962C8B-B14F-4D97-AF65-F5344CB8AC3E}">
-        <p14:creationId xmlns="" xmlns:p14="http://schemas.microsoft.com/office/powerpoint/2010/main" val="509184664"/>
+        <p14:creationId xmlns:p14="http://schemas.microsoft.com/office/powerpoint/2010/main" val="509184664"/>
       </p:ext>
     </p:extLst>
   </p:cSld>
@@ -1486,7 +1486,7 @@
     </p:spTree>
     <p:extLst>
       <p:ext uri="{BB962C8B-B14F-4D97-AF65-F5344CB8AC3E}">
-        <p14:creationId xmlns="" xmlns:p14="http://schemas.microsoft.com/office/powerpoint/2010/main" val="892156260"/>
+        <p14:creationId xmlns:p14="http://schemas.microsoft.com/office/powerpoint/2010/main" val="892156260"/>
       </p:ext>
     </p:extLst>
   </p:cSld>
@@ -1720,7 +1720,7 @@
     </p:spTree>
     <p:extLst>
       <p:ext uri="{BB962C8B-B14F-4D97-AF65-F5344CB8AC3E}">
-        <p14:creationId xmlns="" xmlns:p14="http://schemas.microsoft.com/office/powerpoint/2010/main" val="848249251"/>
+        <p14:creationId xmlns:p14="http://schemas.microsoft.com/office/powerpoint/2010/main" val="848249251"/>
       </p:ext>
     </p:extLst>
   </p:cSld>
@@ -2089,7 +2089,7 @@
     </p:spTree>
     <p:extLst>
       <p:ext uri="{BB962C8B-B14F-4D97-AF65-F5344CB8AC3E}">
-        <p14:creationId xmlns="" xmlns:p14="http://schemas.microsoft.com/office/powerpoint/2010/main" val="723057487"/>
+        <p14:creationId xmlns:p14="http://schemas.microsoft.com/office/powerpoint/2010/main" val="723057487"/>
       </p:ext>
     </p:extLst>
   </p:cSld>
@@ -2209,7 +2209,7 @@
     </p:spTree>
     <p:extLst>
       <p:ext uri="{BB962C8B-B14F-4D97-AF65-F5344CB8AC3E}">
-        <p14:creationId xmlns="" xmlns:p14="http://schemas.microsoft.com/office/powerpoint/2010/main" val="958946590"/>
+        <p14:creationId xmlns:p14="http://schemas.microsoft.com/office/powerpoint/2010/main" val="958946590"/>
       </p:ext>
     </p:extLst>
   </p:cSld>
@@ -2306,7 +2306,7 @@
     </p:spTree>
     <p:extLst>
       <p:ext uri="{BB962C8B-B14F-4D97-AF65-F5344CB8AC3E}">
-        <p14:creationId xmlns="" xmlns:p14="http://schemas.microsoft.com/office/powerpoint/2010/main" val="3845104630"/>
+        <p14:creationId xmlns:p14="http://schemas.microsoft.com/office/powerpoint/2010/main" val="3845104630"/>
       </p:ext>
     </p:extLst>
   </p:cSld>
@@ -2585,7 +2585,7 @@
     </p:spTree>
     <p:extLst>
       <p:ext uri="{BB962C8B-B14F-4D97-AF65-F5344CB8AC3E}">
-        <p14:creationId xmlns="" xmlns:p14="http://schemas.microsoft.com/office/powerpoint/2010/main" val="2714987254"/>
+        <p14:creationId xmlns:p14="http://schemas.microsoft.com/office/powerpoint/2010/main" val="2714987254"/>
       </p:ext>
     </p:extLst>
   </p:cSld>
@@ -2844,7 +2844,7 @@
     </p:spTree>
     <p:extLst>
       <p:ext uri="{BB962C8B-B14F-4D97-AF65-F5344CB8AC3E}">
-        <p14:creationId xmlns="" xmlns:p14="http://schemas.microsoft.com/office/powerpoint/2010/main" val="3689369377"/>
+        <p14:creationId xmlns:p14="http://schemas.microsoft.com/office/powerpoint/2010/main" val="3689369377"/>
       </p:ext>
     </p:extLst>
   </p:cSld>
@@ -3095,7 +3095,7 @@
     </p:spTree>
     <p:extLst>
       <p:ext uri="{BB962C8B-B14F-4D97-AF65-F5344CB8AC3E}">
-        <p14:creationId xmlns="" xmlns:p14="http://schemas.microsoft.com/office/powerpoint/2010/main" val="1205886065"/>
+        <p14:creationId xmlns:p14="http://schemas.microsoft.com/office/powerpoint/2010/main" val="1205886065"/>
       </p:ext>
     </p:extLst>
   </p:cSld>
@@ -3418,7 +3418,7 @@
           <p:cNvPr id="2" name="Title 1">
             <a:extLst>
               <a:ext uri="{FF2B5EF4-FFF2-40B4-BE49-F238E27FC236}">
-                <a16:creationId xmlns="" xmlns:a16="http://schemas.microsoft.com/office/drawing/2014/main" id="{BE2B12DA-F42D-461B-B185-057296D98A88}"/>
+                <a16:creationId xmlns:a16="http://schemas.microsoft.com/office/drawing/2014/main" id="{BE2B12DA-F42D-461B-B185-057296D98A88}"/>
               </a:ext>
             </a:extLst>
           </p:cNvPr>
@@ -3440,12 +3440,8 @@
           <a:lstStyle/>
           <a:p>
             <a:r>
-              <a:rPr lang="en-US" dirty="0" smtClean="0"/>
-              <a:t>Week </a:t>
-            </a:r>
-            <a:r>
-              <a:rPr lang="en-US" dirty="0" smtClean="0"/>
-              <a:t>4</a:t>
+              <a:rPr lang="en-US" dirty="0"/>
+              <a:t>Week 4</a:t>
             </a:r>
             <a:endParaRPr lang="en-CA" dirty="0"/>
           </a:p>
@@ -3456,7 +3452,7 @@
           <p:cNvPr id="3" name="Subtitle 2">
             <a:extLst>
               <a:ext uri="{FF2B5EF4-FFF2-40B4-BE49-F238E27FC236}">
-                <a16:creationId xmlns="" xmlns:a16="http://schemas.microsoft.com/office/drawing/2014/main" id="{563783FE-1566-47A5-9E9E-00D7902C6571}"/>
+                <a16:creationId xmlns:a16="http://schemas.microsoft.com/office/drawing/2014/main" id="{563783FE-1566-47A5-9E9E-00D7902C6571}"/>
               </a:ext>
             </a:extLst>
           </p:cNvPr>
@@ -3481,7 +3477,7 @@
           <a:p>
             <a:pPr algn="l"/>
             <a:r>
-              <a:rPr lang="en-CA" sz="5600" dirty="0" smtClean="0"/>
+              <a:rPr lang="en-CA" sz="5600" dirty="0"/>
               <a:t>Somewhat useful IO &amp; string things</a:t>
             </a:r>
           </a:p>
@@ -3491,7 +3487,7 @@
               <a:buChar char="•"/>
             </a:pPr>
             <a:r>
-              <a:rPr lang="en-CA" sz="5600" dirty="0" smtClean="0"/>
+              <a:rPr lang="en-CA" sz="5600" dirty="0"/>
               <a:t>In C (“c” functions)</a:t>
             </a:r>
           </a:p>
@@ -3501,14 +3497,10 @@
               <a:buChar char="•"/>
             </a:pPr>
             <a:r>
-              <a:rPr lang="en-CA" sz="5600" dirty="0" smtClean="0"/>
-              <a:t>In C++ (</a:t>
-            </a:r>
-            <a:r>
-              <a:rPr lang="en-CA" sz="5600" dirty="0" smtClean="0"/>
-              <a:t>stream)</a:t>
-            </a:r>
-            <a:endParaRPr lang="en-CA" sz="4400" dirty="0" smtClean="0"/>
+              <a:rPr lang="en-CA" sz="5600" dirty="0"/>
+              <a:t>In C++ (stream)</a:t>
+            </a:r>
+            <a:endParaRPr lang="en-CA" sz="4400" dirty="0"/>
           </a:p>
         </p:txBody>
       </p:sp>
@@ -3575,7 +3567,7 @@
     </p:spTree>
     <p:extLst>
       <p:ext uri="{BB962C8B-B14F-4D97-AF65-F5344CB8AC3E}">
-        <p14:creationId xmlns="" xmlns:p14="http://schemas.microsoft.com/office/powerpoint/2010/main" val="1998408397"/>
+        <p14:creationId xmlns:p14="http://schemas.microsoft.com/office/powerpoint/2010/main" val="1998408397"/>
       </p:ext>
     </p:extLst>
   </p:cSld>
@@ -3672,7 +3664,7 @@
           <p:cNvPr id="2" name="Picture 1">
             <a:extLst>
               <a:ext uri="{FF2B5EF4-FFF2-40B4-BE49-F238E27FC236}">
-                <a16:creationId xmlns:a16="http://schemas.microsoft.com/office/drawing/2014/main" xmlns="" id="{D7466AE0-5838-4FEB-9A1A-E463429ABCEB}"/>
+                <a16:creationId xmlns:a16="http://schemas.microsoft.com/office/drawing/2014/main" id="{D7466AE0-5838-4FEB-9A1A-E463429ABCEB}"/>
               </a:ext>
             </a:extLst>
           </p:cNvPr>
@@ -3700,7 +3692,7 @@
     </p:spTree>
     <p:extLst>
       <p:ext uri="{BB962C8B-B14F-4D97-AF65-F5344CB8AC3E}">
-        <p14:creationId xmlns:p14="http://schemas.microsoft.com/office/powerpoint/2010/main" xmlns="" val="3682735416"/>
+        <p14:creationId xmlns:p14="http://schemas.microsoft.com/office/powerpoint/2010/main" val="3682735416"/>
       </p:ext>
     </p:extLst>
   </p:cSld>
@@ -3748,7 +3740,7 @@
           <a:lstStyle/>
           <a:p>
             <a:r>
-              <a:rPr lang="en-US" dirty="0" err="1" smtClean="0"/>
+              <a:rPr lang="en-US" dirty="0" err="1"/>
               <a:t>stringstreams</a:t>
             </a:r>
             <a:endParaRPr lang="en-US" dirty="0"/>
@@ -3776,23 +3768,23 @@
           <a:lstStyle/>
           <a:p>
             <a:r>
-              <a:rPr lang="en-US" sz="2400" dirty="0" smtClean="0"/>
+              <a:rPr lang="en-US" sz="2400" dirty="0"/>
               <a:t>A variant of “stream” (</a:t>
             </a:r>
             <a:r>
-              <a:rPr lang="en-US" sz="2400" dirty="0" err="1" smtClean="0"/>
+              <a:rPr lang="en-US" sz="2400" dirty="0" err="1"/>
               <a:t>iostream</a:t>
             </a:r>
             <a:r>
-              <a:rPr lang="en-US" sz="2400" dirty="0" smtClean="0"/>
+              <a:rPr lang="en-US" sz="2400" dirty="0"/>
               <a:t>, </a:t>
             </a:r>
             <a:r>
-              <a:rPr lang="en-US" sz="2400" dirty="0" err="1" smtClean="0"/>
+              <a:rPr lang="en-US" sz="2400" dirty="0" err="1"/>
               <a:t>filestream</a:t>
             </a:r>
             <a:r>
-              <a:rPr lang="en-US" sz="2400" dirty="0" smtClean="0"/>
+              <a:rPr lang="en-US" sz="2400" dirty="0"/>
               <a:t>, etc.)</a:t>
             </a:r>
             <a:endParaRPr lang="en-US" sz="2000" dirty="0"/>
@@ -3852,16 +3844,12 @@
             </a:r>
             <a:r>
               <a:rPr lang="en-US" sz="2400" dirty="0"/>
-              <a:t> object using the same operators used to print to the </a:t>
-            </a:r>
-            <a:r>
-              <a:rPr lang="en-US" sz="2400" dirty="0" smtClean="0"/>
-              <a:t>console</a:t>
-            </a:r>
-          </a:p>
-          <a:p>
-            <a:r>
-              <a:rPr lang="en-CA" sz="2400" dirty="0" smtClean="0"/>
+              <a:t> object using the same operators used to print to the console</a:t>
+            </a:r>
+          </a:p>
+          <a:p>
+            <a:r>
+              <a:rPr lang="en-CA" sz="2400" dirty="0"/>
               <a:t>It’s very helpful for parsing different data types (number to string, etc.)</a:t>
             </a:r>
             <a:endParaRPr lang="en-US" sz="2400" dirty="0"/>
@@ -3895,7 +3883,7 @@
     </p:spTree>
     <p:extLst>
       <p:ext uri="{BB962C8B-B14F-4D97-AF65-F5344CB8AC3E}">
-        <p14:creationId xmlns:p14="http://schemas.microsoft.com/office/powerpoint/2010/main" xmlns="" val="986956446"/>
+        <p14:creationId xmlns:p14="http://schemas.microsoft.com/office/powerpoint/2010/main" val="986956446"/>
       </p:ext>
     </p:extLst>
   </p:cSld>
@@ -4014,7 +4002,7 @@
           <p:nvPr>
             <p:extLst>
               <p:ext uri="{D42A27DB-BD31-4B8C-83A1-F6EECF244321}">
-                <p14:modId xmlns:p14="http://schemas.microsoft.com/office/powerpoint/2010/main" xmlns="" val="2694458805"/>
+                <p14:modId xmlns:p14="http://schemas.microsoft.com/office/powerpoint/2010/main" val="2694458805"/>
               </p:ext>
             </p:extLst>
           </p:nvPr>
@@ -4033,14 +4021,14 @@
                 <a:gridCol w="2489200">
                   <a:extLst>
                     <a:ext uri="{9D8B030D-6E8A-4147-A177-3AD203B41FA5}">
-                      <a16:colId xmlns:a16="http://schemas.microsoft.com/office/drawing/2014/main" xmlns="" val="20000"/>
+                      <a16:colId xmlns:a16="http://schemas.microsoft.com/office/drawing/2014/main" val="20000"/>
                     </a:ext>
                   </a:extLst>
                 </a:gridCol>
                 <a:gridCol w="8483600">
                   <a:extLst>
                     <a:ext uri="{9D8B030D-6E8A-4147-A177-3AD203B41FA5}">
-                      <a16:colId xmlns:a16="http://schemas.microsoft.com/office/drawing/2014/main" xmlns="" val="20001"/>
+                      <a16:colId xmlns:a16="http://schemas.microsoft.com/office/drawing/2014/main" val="20001"/>
                     </a:ext>
                   </a:extLst>
                 </a:gridCol>
@@ -4183,7 +4171,7 @@
                 </a:tc>
                 <a:extLst>
                   <a:ext uri="{0D108BD9-81ED-4DB2-BD59-A6C34878D82A}">
-                    <a16:rowId xmlns:a16="http://schemas.microsoft.com/office/drawing/2014/main" xmlns="" val="10000"/>
+                    <a16:rowId xmlns:a16="http://schemas.microsoft.com/office/drawing/2014/main" val="10000"/>
                   </a:ext>
                 </a:extLst>
               </a:tr>
@@ -4321,7 +4309,7 @@
                 </a:tc>
                 <a:extLst>
                   <a:ext uri="{0D108BD9-81ED-4DB2-BD59-A6C34878D82A}">
-                    <a16:rowId xmlns:a16="http://schemas.microsoft.com/office/drawing/2014/main" xmlns="" val="10001"/>
+                    <a16:rowId xmlns:a16="http://schemas.microsoft.com/office/drawing/2014/main" val="10001"/>
                   </a:ext>
                 </a:extLst>
               </a:tr>
@@ -4444,7 +4432,7 @@
                 </a:tc>
                 <a:extLst>
                   <a:ext uri="{0D108BD9-81ED-4DB2-BD59-A6C34878D82A}">
-                    <a16:rowId xmlns:a16="http://schemas.microsoft.com/office/drawing/2014/main" xmlns="" val="10002"/>
+                    <a16:rowId xmlns:a16="http://schemas.microsoft.com/office/drawing/2014/main" val="10002"/>
                   </a:ext>
                 </a:extLst>
               </a:tr>
@@ -4455,7 +4443,7 @@
     </p:spTree>
     <p:extLst>
       <p:ext uri="{BB962C8B-B14F-4D97-AF65-F5344CB8AC3E}">
-        <p14:creationId xmlns:p14="http://schemas.microsoft.com/office/powerpoint/2010/main" xmlns="" val="2115101794"/>
+        <p14:creationId xmlns:p14="http://schemas.microsoft.com/office/powerpoint/2010/main" val="2115101794"/>
       </p:ext>
     </p:extLst>
   </p:cSld>
@@ -4973,7 +4961,7 @@
     </p:spTree>
     <p:extLst>
       <p:ext uri="{BB962C8B-B14F-4D97-AF65-F5344CB8AC3E}">
-        <p14:creationId xmlns:p14="http://schemas.microsoft.com/office/powerpoint/2010/main" xmlns="" val="551068213"/>
+        <p14:creationId xmlns:p14="http://schemas.microsoft.com/office/powerpoint/2010/main" val="551068213"/>
       </p:ext>
     </p:extLst>
   </p:cSld>
@@ -5552,7 +5540,7 @@
     </p:spTree>
     <p:extLst>
       <p:ext uri="{BB962C8B-B14F-4D97-AF65-F5344CB8AC3E}">
-        <p14:creationId xmlns:p14="http://schemas.microsoft.com/office/powerpoint/2010/main" xmlns="" val="3355740982"/>
+        <p14:creationId xmlns:p14="http://schemas.microsoft.com/office/powerpoint/2010/main" val="3355740982"/>
       </p:ext>
     </p:extLst>
   </p:cSld>
@@ -6003,7 +5991,7 @@
     </p:spTree>
     <p:extLst>
       <p:ext uri="{BB962C8B-B14F-4D97-AF65-F5344CB8AC3E}">
-        <p14:creationId xmlns:p14="http://schemas.microsoft.com/office/powerpoint/2010/main" xmlns="" val="974161601"/>
+        <p14:creationId xmlns:p14="http://schemas.microsoft.com/office/powerpoint/2010/main" val="974161601"/>
       </p:ext>
     </p:extLst>
   </p:cSld>
@@ -6453,7 +6441,7 @@
     </p:spTree>
     <p:extLst>
       <p:ext uri="{BB962C8B-B14F-4D97-AF65-F5344CB8AC3E}">
-        <p14:creationId xmlns:p14="http://schemas.microsoft.com/office/powerpoint/2010/main" xmlns="" val="937873142"/>
+        <p14:creationId xmlns:p14="http://schemas.microsoft.com/office/powerpoint/2010/main" val="937873142"/>
       </p:ext>
     </p:extLst>
   </p:cSld>
@@ -6640,7 +6628,7 @@
           <p:nvPr>
             <p:extLst>
               <p:ext uri="{D42A27DB-BD31-4B8C-83A1-F6EECF244321}">
-                <p14:modId xmlns:p14="http://schemas.microsoft.com/office/powerpoint/2010/main" xmlns="" val="2867881669"/>
+                <p14:modId xmlns:p14="http://schemas.microsoft.com/office/powerpoint/2010/main" val="2867881669"/>
               </p:ext>
             </p:extLst>
           </p:nvPr>
@@ -6659,14 +6647,14 @@
                 <a:gridCol w="2032000">
                   <a:extLst>
                     <a:ext uri="{9D8B030D-6E8A-4147-A177-3AD203B41FA5}">
-                      <a16:colId xmlns:a16="http://schemas.microsoft.com/office/drawing/2014/main" xmlns="" val="20000"/>
+                      <a16:colId xmlns:a16="http://schemas.microsoft.com/office/drawing/2014/main" val="20000"/>
                     </a:ext>
                   </a:extLst>
                 </a:gridCol>
                 <a:gridCol w="8876632">
                   <a:extLst>
                     <a:ext uri="{9D8B030D-6E8A-4147-A177-3AD203B41FA5}">
-                      <a16:colId xmlns:a16="http://schemas.microsoft.com/office/drawing/2014/main" xmlns="" val="20001"/>
+                      <a16:colId xmlns:a16="http://schemas.microsoft.com/office/drawing/2014/main" val="20001"/>
                     </a:ext>
                   </a:extLst>
                 </a:gridCol>
@@ -6733,7 +6721,7 @@
                 </a:tc>
                 <a:extLst>
                   <a:ext uri="{0D108BD9-81ED-4DB2-BD59-A6C34878D82A}">
-                    <a16:rowId xmlns:a16="http://schemas.microsoft.com/office/drawing/2014/main" xmlns="" val="10000"/>
+                    <a16:rowId xmlns:a16="http://schemas.microsoft.com/office/drawing/2014/main" val="10000"/>
                   </a:ext>
                 </a:extLst>
               </a:tr>
@@ -6816,7 +6804,7 @@
                 </a:tc>
                 <a:extLst>
                   <a:ext uri="{0D108BD9-81ED-4DB2-BD59-A6C34878D82A}">
-                    <a16:rowId xmlns:a16="http://schemas.microsoft.com/office/drawing/2014/main" xmlns="" val="1200942707"/>
+                    <a16:rowId xmlns:a16="http://schemas.microsoft.com/office/drawing/2014/main" val="1200942707"/>
                   </a:ext>
                 </a:extLst>
               </a:tr>
@@ -6866,7 +6854,7 @@
                 </a:tc>
                 <a:extLst>
                   <a:ext uri="{0D108BD9-81ED-4DB2-BD59-A6C34878D82A}">
-                    <a16:rowId xmlns:a16="http://schemas.microsoft.com/office/drawing/2014/main" xmlns="" val="618748355"/>
+                    <a16:rowId xmlns:a16="http://schemas.microsoft.com/office/drawing/2014/main" val="618748355"/>
                   </a:ext>
                 </a:extLst>
               </a:tr>
@@ -6916,7 +6904,7 @@
                 </a:tc>
                 <a:extLst>
                   <a:ext uri="{0D108BD9-81ED-4DB2-BD59-A6C34878D82A}">
-                    <a16:rowId xmlns:a16="http://schemas.microsoft.com/office/drawing/2014/main" xmlns="" val="3022187537"/>
+                    <a16:rowId xmlns:a16="http://schemas.microsoft.com/office/drawing/2014/main" val="3022187537"/>
                   </a:ext>
                 </a:extLst>
               </a:tr>
@@ -6983,7 +6971,7 @@
                 </a:tc>
                 <a:extLst>
                   <a:ext uri="{0D108BD9-81ED-4DB2-BD59-A6C34878D82A}">
-                    <a16:rowId xmlns:a16="http://schemas.microsoft.com/office/drawing/2014/main" xmlns="" val="10001"/>
+                    <a16:rowId xmlns:a16="http://schemas.microsoft.com/office/drawing/2014/main" val="10001"/>
                   </a:ext>
                 </a:extLst>
               </a:tr>
@@ -6994,7 +6982,7 @@
     </p:spTree>
     <p:extLst>
       <p:ext uri="{BB962C8B-B14F-4D97-AF65-F5344CB8AC3E}">
-        <p14:creationId xmlns:p14="http://schemas.microsoft.com/office/powerpoint/2010/main" xmlns="" val="4278854288"/>
+        <p14:creationId xmlns:p14="http://schemas.microsoft.com/office/powerpoint/2010/main" val="4278854288"/>
       </p:ext>
     </p:extLst>
   </p:cSld>
@@ -7145,7 +7133,7 @@
           <p:nvPr>
             <p:extLst>
               <p:ext uri="{D42A27DB-BD31-4B8C-83A1-F6EECF244321}">
-                <p14:modId xmlns:p14="http://schemas.microsoft.com/office/powerpoint/2010/main" xmlns="" val="426473108"/>
+                <p14:modId xmlns:p14="http://schemas.microsoft.com/office/powerpoint/2010/main" val="426473108"/>
               </p:ext>
             </p:extLst>
           </p:nvPr>
@@ -7164,21 +7152,21 @@
                 <a:gridCol w="2133599">
                   <a:extLst>
                     <a:ext uri="{9D8B030D-6E8A-4147-A177-3AD203B41FA5}">
-                      <a16:colId xmlns:a16="http://schemas.microsoft.com/office/drawing/2014/main" xmlns="" val="20000"/>
+                      <a16:colId xmlns:a16="http://schemas.microsoft.com/office/drawing/2014/main" val="20000"/>
                     </a:ext>
                   </a:extLst>
                 </a:gridCol>
                 <a:gridCol w="1673957">
                   <a:extLst>
                     <a:ext uri="{9D8B030D-6E8A-4147-A177-3AD203B41FA5}">
-                      <a16:colId xmlns:a16="http://schemas.microsoft.com/office/drawing/2014/main" xmlns="" val="20001"/>
+                      <a16:colId xmlns:a16="http://schemas.microsoft.com/office/drawing/2014/main" val="20001"/>
                     </a:ext>
                   </a:extLst>
                 </a:gridCol>
                 <a:gridCol w="3609245">
                   <a:extLst>
                     <a:ext uri="{9D8B030D-6E8A-4147-A177-3AD203B41FA5}">
-                      <a16:colId xmlns:a16="http://schemas.microsoft.com/office/drawing/2014/main" xmlns="" val="2355423301"/>
+                      <a16:colId xmlns:a16="http://schemas.microsoft.com/office/drawing/2014/main" val="2355423301"/>
                     </a:ext>
                   </a:extLst>
                 </a:gridCol>
@@ -7253,7 +7241,7 @@
                 </a:tc>
                 <a:extLst>
                   <a:ext uri="{0D108BD9-81ED-4DB2-BD59-A6C34878D82A}">
-                    <a16:rowId xmlns:a16="http://schemas.microsoft.com/office/drawing/2014/main" xmlns="" val="10000"/>
+                    <a16:rowId xmlns:a16="http://schemas.microsoft.com/office/drawing/2014/main" val="10000"/>
                   </a:ext>
                 </a:extLst>
               </a:tr>
@@ -7304,7 +7292,7 @@
                 </a:tc>
                 <a:extLst>
                   <a:ext uri="{0D108BD9-81ED-4DB2-BD59-A6C34878D82A}">
-                    <a16:rowId xmlns:a16="http://schemas.microsoft.com/office/drawing/2014/main" xmlns="" val="10001"/>
+                    <a16:rowId xmlns:a16="http://schemas.microsoft.com/office/drawing/2014/main" val="10001"/>
                   </a:ext>
                 </a:extLst>
               </a:tr>
@@ -7359,7 +7347,7 @@
                 </a:tc>
                 <a:extLst>
                   <a:ext uri="{0D108BD9-81ED-4DB2-BD59-A6C34878D82A}">
-                    <a16:rowId xmlns:a16="http://schemas.microsoft.com/office/drawing/2014/main" xmlns="" val="10002"/>
+                    <a16:rowId xmlns:a16="http://schemas.microsoft.com/office/drawing/2014/main" val="10002"/>
                   </a:ext>
                 </a:extLst>
               </a:tr>
@@ -7410,7 +7398,7 @@
                 </a:tc>
                 <a:extLst>
                   <a:ext uri="{0D108BD9-81ED-4DB2-BD59-A6C34878D82A}">
-                    <a16:rowId xmlns:a16="http://schemas.microsoft.com/office/drawing/2014/main" xmlns="" val="10003"/>
+                    <a16:rowId xmlns:a16="http://schemas.microsoft.com/office/drawing/2014/main" val="10003"/>
                   </a:ext>
                 </a:extLst>
               </a:tr>
@@ -7461,7 +7449,7 @@
                 </a:tc>
                 <a:extLst>
                   <a:ext uri="{0D108BD9-81ED-4DB2-BD59-A6C34878D82A}">
-                    <a16:rowId xmlns:a16="http://schemas.microsoft.com/office/drawing/2014/main" xmlns="" val="10004"/>
+                    <a16:rowId xmlns:a16="http://schemas.microsoft.com/office/drawing/2014/main" val="10004"/>
                   </a:ext>
                 </a:extLst>
               </a:tr>
@@ -7472,7 +7460,7 @@
     </p:spTree>
     <p:extLst>
       <p:ext uri="{BB962C8B-B14F-4D97-AF65-F5344CB8AC3E}">
-        <p14:creationId xmlns:p14="http://schemas.microsoft.com/office/powerpoint/2010/main" xmlns="" val="560682534"/>
+        <p14:creationId xmlns:p14="http://schemas.microsoft.com/office/powerpoint/2010/main" val="560682534"/>
       </p:ext>
     </p:extLst>
   </p:cSld>
@@ -7564,7 +7552,7 @@
           <p:nvPr>
             <p:extLst>
               <p:ext uri="{D42A27DB-BD31-4B8C-83A1-F6EECF244321}">
-                <p14:modId xmlns:p14="http://schemas.microsoft.com/office/powerpoint/2010/main" xmlns="" val="418449302"/>
+                <p14:modId xmlns:p14="http://schemas.microsoft.com/office/powerpoint/2010/main" val="418449302"/>
               </p:ext>
             </p:extLst>
           </p:nvPr>
@@ -7583,14 +7571,14 @@
                 <a:gridCol w="3023937">
                   <a:extLst>
                     <a:ext uri="{9D8B030D-6E8A-4147-A177-3AD203B41FA5}">
-                      <a16:colId xmlns:a16="http://schemas.microsoft.com/office/drawing/2014/main" xmlns="" val="20000"/>
+                      <a16:colId xmlns:a16="http://schemas.microsoft.com/office/drawing/2014/main" val="20000"/>
                     </a:ext>
                   </a:extLst>
                 </a:gridCol>
                 <a:gridCol w="7924801">
                   <a:extLst>
                     <a:ext uri="{9D8B030D-6E8A-4147-A177-3AD203B41FA5}">
-                      <a16:colId xmlns:a16="http://schemas.microsoft.com/office/drawing/2014/main" xmlns="" val="20001"/>
+                      <a16:colId xmlns:a16="http://schemas.microsoft.com/office/drawing/2014/main" val="20001"/>
                     </a:ext>
                   </a:extLst>
                 </a:gridCol>
@@ -7624,7 +7612,7 @@
                 </a:tc>
                 <a:extLst>
                   <a:ext uri="{0D108BD9-81ED-4DB2-BD59-A6C34878D82A}">
-                    <a16:rowId xmlns:a16="http://schemas.microsoft.com/office/drawing/2014/main" xmlns="" val="10000"/>
+                    <a16:rowId xmlns:a16="http://schemas.microsoft.com/office/drawing/2014/main" val="10000"/>
                   </a:ext>
                 </a:extLst>
               </a:tr>
@@ -7678,7 +7666,7 @@
                 </a:tc>
                 <a:extLst>
                   <a:ext uri="{0D108BD9-81ED-4DB2-BD59-A6C34878D82A}">
-                    <a16:rowId xmlns:a16="http://schemas.microsoft.com/office/drawing/2014/main" xmlns="" val="10001"/>
+                    <a16:rowId xmlns:a16="http://schemas.microsoft.com/office/drawing/2014/main" val="10001"/>
                   </a:ext>
                 </a:extLst>
               </a:tr>
@@ -7759,7 +7747,7 @@
                 </a:tc>
                 <a:extLst>
                   <a:ext uri="{0D108BD9-81ED-4DB2-BD59-A6C34878D82A}">
-                    <a16:rowId xmlns:a16="http://schemas.microsoft.com/office/drawing/2014/main" xmlns="" val="10002"/>
+                    <a16:rowId xmlns:a16="http://schemas.microsoft.com/office/drawing/2014/main" val="10002"/>
                   </a:ext>
                 </a:extLst>
               </a:tr>
@@ -7821,7 +7809,7 @@
                 </a:tc>
                 <a:extLst>
                   <a:ext uri="{0D108BD9-81ED-4DB2-BD59-A6C34878D82A}">
-                    <a16:rowId xmlns:a16="http://schemas.microsoft.com/office/drawing/2014/main" xmlns="" val="10003"/>
+                    <a16:rowId xmlns:a16="http://schemas.microsoft.com/office/drawing/2014/main" val="10003"/>
                   </a:ext>
                 </a:extLst>
               </a:tr>
@@ -7958,7 +7946,7 @@
                 </a:tc>
                 <a:extLst>
                   <a:ext uri="{0D108BD9-81ED-4DB2-BD59-A6C34878D82A}">
-                    <a16:rowId xmlns:a16="http://schemas.microsoft.com/office/drawing/2014/main" xmlns="" val="10004"/>
+                    <a16:rowId xmlns:a16="http://schemas.microsoft.com/office/drawing/2014/main" val="10004"/>
                   </a:ext>
                 </a:extLst>
               </a:tr>
@@ -8006,7 +7994,7 @@
                 </a:tc>
                 <a:extLst>
                   <a:ext uri="{0D108BD9-81ED-4DB2-BD59-A6C34878D82A}">
-                    <a16:rowId xmlns:a16="http://schemas.microsoft.com/office/drawing/2014/main" xmlns="" val="1231799818"/>
+                    <a16:rowId xmlns:a16="http://schemas.microsoft.com/office/drawing/2014/main" val="1231799818"/>
                   </a:ext>
                 </a:extLst>
               </a:tr>
@@ -8049,7 +8037,7 @@
                 </a:tc>
                 <a:extLst>
                   <a:ext uri="{0D108BD9-81ED-4DB2-BD59-A6C34878D82A}">
-                    <a16:rowId xmlns:a16="http://schemas.microsoft.com/office/drawing/2014/main" xmlns="" val="3970364083"/>
+                    <a16:rowId xmlns:a16="http://schemas.microsoft.com/office/drawing/2014/main" val="3970364083"/>
                   </a:ext>
                 </a:extLst>
               </a:tr>
@@ -8099,7 +8087,7 @@
                 </a:tc>
                 <a:extLst>
                   <a:ext uri="{0D108BD9-81ED-4DB2-BD59-A6C34878D82A}">
-                    <a16:rowId xmlns:a16="http://schemas.microsoft.com/office/drawing/2014/main" xmlns="" val="4104921342"/>
+                    <a16:rowId xmlns:a16="http://schemas.microsoft.com/office/drawing/2014/main" val="4104921342"/>
                   </a:ext>
                 </a:extLst>
               </a:tr>
@@ -8178,7 +8166,7 @@
                 </a:tc>
                 <a:extLst>
                   <a:ext uri="{0D108BD9-81ED-4DB2-BD59-A6C34878D82A}">
-                    <a16:rowId xmlns:a16="http://schemas.microsoft.com/office/drawing/2014/main" xmlns="" val="2991893031"/>
+                    <a16:rowId xmlns:a16="http://schemas.microsoft.com/office/drawing/2014/main" val="2991893031"/>
                   </a:ext>
                 </a:extLst>
               </a:tr>
@@ -8189,7 +8177,7 @@
     </p:spTree>
     <p:extLst>
       <p:ext uri="{BB962C8B-B14F-4D97-AF65-F5344CB8AC3E}">
-        <p14:creationId xmlns:p14="http://schemas.microsoft.com/office/powerpoint/2010/main" xmlns="" val="3571463242"/>
+        <p14:creationId xmlns:p14="http://schemas.microsoft.com/office/powerpoint/2010/main" val="3571463242"/>
       </p:ext>
     </p:extLst>
   </p:cSld>
@@ -8237,10 +8225,9 @@
           <a:lstStyle/>
           <a:p>
             <a:r>
-              <a:rPr lang="en-CA" dirty="0" smtClean="0"/>
+              <a:rPr lang="en-CA" dirty="0"/>
               <a:t>C-strings (i.e. how “C” thinks of strings)</a:t>
             </a:r>
-            <a:endParaRPr lang="en-CA" dirty="0"/>
           </a:p>
         </p:txBody>
       </p:sp>
@@ -8359,16 +8346,12 @@
               <a:t>abc</a:t>
             </a:r>
             <a:r>
-              <a:rPr lang="en-CA" sz="1600" dirty="0" smtClean="0">
+              <a:rPr lang="en-CA" sz="1600" dirty="0">
                 <a:latin typeface="Courier New" panose="02070309020205020404" pitchFamily="49" charset="0"/>
                 <a:cs typeface="Courier New" panose="02070309020205020404" pitchFamily="49" charset="0"/>
               </a:rPr>
               <a:t>”;  // is really 4 characters (with the end zero “0”)</a:t>
             </a:r>
-            <a:endParaRPr lang="en-CA" sz="1600" dirty="0">
-              <a:latin typeface="Courier New" panose="02070309020205020404" pitchFamily="49" charset="0"/>
-              <a:cs typeface="Courier New" panose="02070309020205020404" pitchFamily="49" charset="0"/>
-            </a:endParaRPr>
           </a:p>
           <a:p>
             <a:pPr lvl="1"/>
@@ -8399,55 +8382,25 @@
               <a:rPr lang="en-CA" sz="2000" dirty="0">
                 <a:cs typeface="Courier New" panose="02070309020205020404" pitchFamily="49" charset="0"/>
               </a:rPr>
-              <a:t>Each C-string array contains the null </a:t>
-            </a:r>
-            <a:r>
-              <a:rPr lang="en-CA" sz="2000" dirty="0" smtClean="0">
-                <a:cs typeface="Courier New" panose="02070309020205020404" pitchFamily="49" charset="0"/>
-              </a:rPr>
-              <a:t>character (at the end, to tell when it’s “done”)</a:t>
-            </a:r>
-            <a:endParaRPr lang="en-CA" sz="2000" dirty="0">
-              <a:cs typeface="Courier New" panose="02070309020205020404" pitchFamily="49" charset="0"/>
-            </a:endParaRPr>
+              <a:t>Each C-string array contains the null character (at the end, to tell when it’s “done”)</a:t>
+            </a:r>
           </a:p>
           <a:p>
             <a:r>
               <a:rPr lang="en-CA" sz="2000" dirty="0">
                 <a:cs typeface="Courier New" panose="02070309020205020404" pitchFamily="49" charset="0"/>
               </a:rPr>
-              <a:t>A C-string array has a fixed </a:t>
-            </a:r>
-            <a:r>
-              <a:rPr lang="en-CA" sz="2000" dirty="0" smtClean="0">
-                <a:cs typeface="Courier New" panose="02070309020205020404" pitchFamily="49" charset="0"/>
-              </a:rPr>
-              <a:t>capacity at compile time </a:t>
-            </a:r>
-            <a:r>
-              <a:rPr lang="en-CA" sz="2000" dirty="0">
-                <a:cs typeface="Courier New" panose="02070309020205020404" pitchFamily="49" charset="0"/>
-              </a:rPr>
-              <a:t>(size is &lt;= capacity</a:t>
-            </a:r>
-            <a:r>
-              <a:rPr lang="en-CA" sz="2000" dirty="0" smtClean="0">
-                <a:cs typeface="Courier New" panose="02070309020205020404" pitchFamily="49" charset="0"/>
-              </a:rPr>
-              <a:t>).</a:t>
+              <a:t>A C-string array has a fixed capacity at compile time (size is &lt;= capacity).</a:t>
             </a:r>
           </a:p>
           <a:p>
             <a:pPr lvl="1"/>
             <a:r>
-              <a:rPr lang="en-CA" sz="1600" dirty="0" smtClean="0">
+              <a:rPr lang="en-CA" sz="1600" dirty="0">
                 <a:cs typeface="Courier New" panose="02070309020205020404" pitchFamily="49" charset="0"/>
               </a:rPr>
               <a:t>But you can’t know that capacity (like you can’t know the size of any array, right?)</a:t>
             </a:r>
-            <a:endParaRPr lang="en-CA" sz="1600" dirty="0">
-              <a:cs typeface="Courier New" panose="02070309020205020404" pitchFamily="49" charset="0"/>
-            </a:endParaRPr>
           </a:p>
         </p:txBody>
       </p:sp>
@@ -8460,7 +8413,7 @@
           <p:nvPr>
             <p:extLst>
               <p:ext uri="{D42A27DB-BD31-4B8C-83A1-F6EECF244321}">
-                <p14:modId xmlns:p14="http://schemas.microsoft.com/office/powerpoint/2010/main" xmlns="" val="2750192742"/>
+                <p14:modId xmlns:p14="http://schemas.microsoft.com/office/powerpoint/2010/main" val="2750192742"/>
               </p:ext>
             </p:extLst>
           </p:nvPr>
@@ -8479,42 +8432,42 @@
                 <a:gridCol w="873760">
                   <a:extLst>
                     <a:ext uri="{9D8B030D-6E8A-4147-A177-3AD203B41FA5}">
-                      <a16:colId xmlns:a16="http://schemas.microsoft.com/office/drawing/2014/main" xmlns="" val="1876972477"/>
+                      <a16:colId xmlns:a16="http://schemas.microsoft.com/office/drawing/2014/main" val="1876972477"/>
                     </a:ext>
                   </a:extLst>
                 </a:gridCol>
                 <a:gridCol w="873760">
                   <a:extLst>
                     <a:ext uri="{9D8B030D-6E8A-4147-A177-3AD203B41FA5}">
-                      <a16:colId xmlns:a16="http://schemas.microsoft.com/office/drawing/2014/main" xmlns="" val="3227208240"/>
+                      <a16:colId xmlns:a16="http://schemas.microsoft.com/office/drawing/2014/main" val="3227208240"/>
                     </a:ext>
                   </a:extLst>
                 </a:gridCol>
                 <a:gridCol w="873760">
                   <a:extLst>
                     <a:ext uri="{9D8B030D-6E8A-4147-A177-3AD203B41FA5}">
-                      <a16:colId xmlns:a16="http://schemas.microsoft.com/office/drawing/2014/main" xmlns="" val="3076531962"/>
+                      <a16:colId xmlns:a16="http://schemas.microsoft.com/office/drawing/2014/main" val="3076531962"/>
                     </a:ext>
                   </a:extLst>
                 </a:gridCol>
                 <a:gridCol w="873760">
                   <a:extLst>
                     <a:ext uri="{9D8B030D-6E8A-4147-A177-3AD203B41FA5}">
-                      <a16:colId xmlns:a16="http://schemas.microsoft.com/office/drawing/2014/main" xmlns="" val="1374241277"/>
+                      <a16:colId xmlns:a16="http://schemas.microsoft.com/office/drawing/2014/main" val="1374241277"/>
                     </a:ext>
                   </a:extLst>
                 </a:gridCol>
                 <a:gridCol w="873760">
                   <a:extLst>
                     <a:ext uri="{9D8B030D-6E8A-4147-A177-3AD203B41FA5}">
-                      <a16:colId xmlns:a16="http://schemas.microsoft.com/office/drawing/2014/main" xmlns="" val="4202660702"/>
+                      <a16:colId xmlns:a16="http://schemas.microsoft.com/office/drawing/2014/main" val="4202660702"/>
                     </a:ext>
                   </a:extLst>
                 </a:gridCol>
                 <a:gridCol w="873760">
                   <a:extLst>
                     <a:ext uri="{9D8B030D-6E8A-4147-A177-3AD203B41FA5}">
-                      <a16:colId xmlns:a16="http://schemas.microsoft.com/office/drawing/2014/main" xmlns="" val="3479438243"/>
+                      <a16:colId xmlns:a16="http://schemas.microsoft.com/office/drawing/2014/main" val="3479438243"/>
                     </a:ext>
                   </a:extLst>
                 </a:gridCol>
@@ -8849,7 +8802,7 @@
                 </a:tc>
                 <a:extLst>
                   <a:ext uri="{0D108BD9-81ED-4DB2-BD59-A6C34878D82A}">
-                    <a16:rowId xmlns:a16="http://schemas.microsoft.com/office/drawing/2014/main" xmlns="" val="744414661"/>
+                    <a16:rowId xmlns:a16="http://schemas.microsoft.com/office/drawing/2014/main" val="744414661"/>
                   </a:ext>
                 </a:extLst>
               </a:tr>
@@ -9186,7 +9139,7 @@
                 </a:tc>
                 <a:extLst>
                   <a:ext uri="{0D108BD9-81ED-4DB2-BD59-A6C34878D82A}">
-                    <a16:rowId xmlns:a16="http://schemas.microsoft.com/office/drawing/2014/main" xmlns="" val="1852556893"/>
+                    <a16:rowId xmlns:a16="http://schemas.microsoft.com/office/drawing/2014/main" val="1852556893"/>
                   </a:ext>
                 </a:extLst>
               </a:tr>
@@ -9203,7 +9156,7 @@
           <p:nvPr>
             <p:extLst>
               <p:ext uri="{D42A27DB-BD31-4B8C-83A1-F6EECF244321}">
-                <p14:modId xmlns:p14="http://schemas.microsoft.com/office/powerpoint/2010/main" xmlns="" val="1393840596"/>
+                <p14:modId xmlns:p14="http://schemas.microsoft.com/office/powerpoint/2010/main" val="1393840596"/>
               </p:ext>
             </p:extLst>
           </p:nvPr>
@@ -9222,84 +9175,84 @@
                 <a:gridCol w="751840">
                   <a:extLst>
                     <a:ext uri="{9D8B030D-6E8A-4147-A177-3AD203B41FA5}">
-                      <a16:colId xmlns:a16="http://schemas.microsoft.com/office/drawing/2014/main" xmlns="" val="1876972477"/>
+                      <a16:colId xmlns:a16="http://schemas.microsoft.com/office/drawing/2014/main" val="1876972477"/>
                     </a:ext>
                   </a:extLst>
                 </a:gridCol>
                 <a:gridCol w="751840">
                   <a:extLst>
                     <a:ext uri="{9D8B030D-6E8A-4147-A177-3AD203B41FA5}">
-                      <a16:colId xmlns:a16="http://schemas.microsoft.com/office/drawing/2014/main" xmlns="" val="3227208240"/>
+                      <a16:colId xmlns:a16="http://schemas.microsoft.com/office/drawing/2014/main" val="3227208240"/>
                     </a:ext>
                   </a:extLst>
                 </a:gridCol>
                 <a:gridCol w="751840">
                   <a:extLst>
                     <a:ext uri="{9D8B030D-6E8A-4147-A177-3AD203B41FA5}">
-                      <a16:colId xmlns:a16="http://schemas.microsoft.com/office/drawing/2014/main" xmlns="" val="3076531962"/>
+                      <a16:colId xmlns:a16="http://schemas.microsoft.com/office/drawing/2014/main" val="3076531962"/>
                     </a:ext>
                   </a:extLst>
                 </a:gridCol>
                 <a:gridCol w="751840">
                   <a:extLst>
                     <a:ext uri="{9D8B030D-6E8A-4147-A177-3AD203B41FA5}">
-                      <a16:colId xmlns:a16="http://schemas.microsoft.com/office/drawing/2014/main" xmlns="" val="1374241277"/>
+                      <a16:colId xmlns:a16="http://schemas.microsoft.com/office/drawing/2014/main" val="1374241277"/>
                     </a:ext>
                   </a:extLst>
                 </a:gridCol>
                 <a:gridCol w="751840">
                   <a:extLst>
                     <a:ext uri="{9D8B030D-6E8A-4147-A177-3AD203B41FA5}">
-                      <a16:colId xmlns:a16="http://schemas.microsoft.com/office/drawing/2014/main" xmlns="" val="4202660702"/>
+                      <a16:colId xmlns:a16="http://schemas.microsoft.com/office/drawing/2014/main" val="4202660702"/>
                     </a:ext>
                   </a:extLst>
                 </a:gridCol>
                 <a:gridCol w="751840">
                   <a:extLst>
                     <a:ext uri="{9D8B030D-6E8A-4147-A177-3AD203B41FA5}">
-                      <a16:colId xmlns:a16="http://schemas.microsoft.com/office/drawing/2014/main" xmlns="" val="3479438243"/>
+                      <a16:colId xmlns:a16="http://schemas.microsoft.com/office/drawing/2014/main" val="3479438243"/>
                     </a:ext>
                   </a:extLst>
                 </a:gridCol>
                 <a:gridCol w="751840">
                   <a:extLst>
                     <a:ext uri="{9D8B030D-6E8A-4147-A177-3AD203B41FA5}">
-                      <a16:colId xmlns:a16="http://schemas.microsoft.com/office/drawing/2014/main" xmlns="" val="685448591"/>
+                      <a16:colId xmlns:a16="http://schemas.microsoft.com/office/drawing/2014/main" val="685448591"/>
                     </a:ext>
                   </a:extLst>
                 </a:gridCol>
                 <a:gridCol w="751840">
                   <a:extLst>
                     <a:ext uri="{9D8B030D-6E8A-4147-A177-3AD203B41FA5}">
-                      <a16:colId xmlns:a16="http://schemas.microsoft.com/office/drawing/2014/main" xmlns="" val="129910528"/>
+                      <a16:colId xmlns:a16="http://schemas.microsoft.com/office/drawing/2014/main" val="129910528"/>
                     </a:ext>
                   </a:extLst>
                 </a:gridCol>
                 <a:gridCol w="751840">
                   <a:extLst>
                     <a:ext uri="{9D8B030D-6E8A-4147-A177-3AD203B41FA5}">
-                      <a16:colId xmlns:a16="http://schemas.microsoft.com/office/drawing/2014/main" xmlns="" val="4256303470"/>
+                      <a16:colId xmlns:a16="http://schemas.microsoft.com/office/drawing/2014/main" val="4256303470"/>
                     </a:ext>
                   </a:extLst>
                 </a:gridCol>
                 <a:gridCol w="751840">
                   <a:extLst>
                     <a:ext uri="{9D8B030D-6E8A-4147-A177-3AD203B41FA5}">
-                      <a16:colId xmlns:a16="http://schemas.microsoft.com/office/drawing/2014/main" xmlns="" val="2663007010"/>
+                      <a16:colId xmlns:a16="http://schemas.microsoft.com/office/drawing/2014/main" val="2663007010"/>
                     </a:ext>
                   </a:extLst>
                 </a:gridCol>
                 <a:gridCol w="751840">
                   <a:extLst>
                     <a:ext uri="{9D8B030D-6E8A-4147-A177-3AD203B41FA5}">
-                      <a16:colId xmlns:a16="http://schemas.microsoft.com/office/drawing/2014/main" xmlns="" val="2254187994"/>
+                      <a16:colId xmlns:a16="http://schemas.microsoft.com/office/drawing/2014/main" val="2254187994"/>
                     </a:ext>
                   </a:extLst>
                 </a:gridCol>
                 <a:gridCol w="751840">
                   <a:extLst>
                     <a:ext uri="{9D8B030D-6E8A-4147-A177-3AD203B41FA5}">
-                      <a16:colId xmlns:a16="http://schemas.microsoft.com/office/drawing/2014/main" xmlns="" val="1044281140"/>
+                      <a16:colId xmlns:a16="http://schemas.microsoft.com/office/drawing/2014/main" val="1044281140"/>
                     </a:ext>
                   </a:extLst>
                 </a:gridCol>
@@ -9976,7 +9929,7 @@
                 </a:tc>
                 <a:extLst>
                   <a:ext uri="{0D108BD9-81ED-4DB2-BD59-A6C34878D82A}">
-                    <a16:rowId xmlns:a16="http://schemas.microsoft.com/office/drawing/2014/main" xmlns="" val="744414661"/>
+                    <a16:rowId xmlns:a16="http://schemas.microsoft.com/office/drawing/2014/main" val="744414661"/>
                   </a:ext>
                 </a:extLst>
               </a:tr>
@@ -10667,7 +10620,7 @@
                 </a:tc>
                 <a:extLst>
                   <a:ext uri="{0D108BD9-81ED-4DB2-BD59-A6C34878D82A}">
-                    <a16:rowId xmlns:a16="http://schemas.microsoft.com/office/drawing/2014/main" xmlns="" val="1852556893"/>
+                    <a16:rowId xmlns:a16="http://schemas.microsoft.com/office/drawing/2014/main" val="1852556893"/>
                   </a:ext>
                 </a:extLst>
               </a:tr>
@@ -10678,7 +10631,7 @@
     </p:spTree>
     <p:extLst>
       <p:ext uri="{BB962C8B-B14F-4D97-AF65-F5344CB8AC3E}">
-        <p14:creationId xmlns:p14="http://schemas.microsoft.com/office/powerpoint/2010/main" xmlns="" val="2115101794"/>
+        <p14:creationId xmlns:p14="http://schemas.microsoft.com/office/powerpoint/2010/main" val="2115101794"/>
       </p:ext>
     </p:extLst>
   </p:cSld>
@@ -10962,7 +10915,7 @@
     </p:spTree>
     <p:extLst>
       <p:ext uri="{BB962C8B-B14F-4D97-AF65-F5344CB8AC3E}">
-        <p14:creationId xmlns:p14="http://schemas.microsoft.com/office/powerpoint/2010/main" xmlns="" val="3140416617"/>
+        <p14:creationId xmlns:p14="http://schemas.microsoft.com/office/powerpoint/2010/main" val="3140416617"/>
       </p:ext>
     </p:extLst>
   </p:cSld>
@@ -11410,7 +11363,7 @@
     </p:spTree>
     <p:extLst>
       <p:ext uri="{BB962C8B-B14F-4D97-AF65-F5344CB8AC3E}">
-        <p14:creationId xmlns:p14="http://schemas.microsoft.com/office/powerpoint/2010/main" xmlns="" val="79907884"/>
+        <p14:creationId xmlns:p14="http://schemas.microsoft.com/office/powerpoint/2010/main" val="79907884"/>
       </p:ext>
     </p:extLst>
   </p:cSld>
@@ -12196,7 +12149,7 @@
     </p:spTree>
     <p:extLst>
       <p:ext uri="{BB962C8B-B14F-4D97-AF65-F5344CB8AC3E}">
-        <p14:creationId xmlns:p14="http://schemas.microsoft.com/office/powerpoint/2010/main" xmlns="" val="1243793376"/>
+        <p14:creationId xmlns:p14="http://schemas.microsoft.com/office/powerpoint/2010/main" val="1243793376"/>
       </p:ext>
     </p:extLst>
   </p:cSld>
@@ -13870,7 +13823,7 @@
     </p:spTree>
     <p:extLst>
       <p:ext uri="{BB962C8B-B14F-4D97-AF65-F5344CB8AC3E}">
-        <p14:creationId xmlns:p14="http://schemas.microsoft.com/office/powerpoint/2010/main" xmlns="" val="3362588668"/>
+        <p14:creationId xmlns:p14="http://schemas.microsoft.com/office/powerpoint/2010/main" val="3362588668"/>
       </p:ext>
     </p:extLst>
   </p:cSld>
@@ -14316,10 +14269,6 @@
               <a:rPr lang="en-CA" dirty="0" err="1"/>
               <a:t>cout</a:t>
             </a:r>
-            <a:r>
-              <a:rPr lang="en-CA" dirty="0"/>
-              <a:t/>
-            </a:r>
             <a:br>
               <a:rPr lang="en-CA" dirty="0"/>
             </a:br>
@@ -14346,12 +14295,6 @@
                 <a:cs typeface="Courier New" panose="02070309020205020404" pitchFamily="49" charset="0"/>
               </a:rPr>
               <a:t>&gt;</a:t>
-            </a:r>
-            <a:r>
-              <a:rPr lang="en-CA" sz="2400" b="0" dirty="0">
-                <a:effectLst/>
-              </a:rPr>
-              <a:t/>
             </a:r>
             <a:br>
               <a:rPr lang="en-CA" sz="2400" b="0" dirty="0">
@@ -14575,7 +14518,7 @@
     </p:spTree>
     <p:extLst>
       <p:ext uri="{BB962C8B-B14F-4D97-AF65-F5344CB8AC3E}">
-        <p14:creationId xmlns:p14="http://schemas.microsoft.com/office/powerpoint/2010/main" xmlns="" val="1370168957"/>
+        <p14:creationId xmlns:p14="http://schemas.microsoft.com/office/powerpoint/2010/main" val="1370168957"/>
       </p:ext>
     </p:extLst>
   </p:cSld>
@@ -15200,7 +15143,7 @@
     </p:spTree>
     <p:extLst>
       <p:ext uri="{BB962C8B-B14F-4D97-AF65-F5344CB8AC3E}">
-        <p14:creationId xmlns:p14="http://schemas.microsoft.com/office/powerpoint/2010/main" xmlns="" val="3327267731"/>
+        <p14:creationId xmlns:p14="http://schemas.microsoft.com/office/powerpoint/2010/main" val="3327267731"/>
       </p:ext>
     </p:extLst>
   </p:cSld>
@@ -15531,7 +15474,7 @@
     </p:spTree>
     <p:extLst>
       <p:ext uri="{BB962C8B-B14F-4D97-AF65-F5344CB8AC3E}">
-        <p14:creationId xmlns:p14="http://schemas.microsoft.com/office/powerpoint/2010/main" xmlns="" val="3256369180"/>
+        <p14:creationId xmlns:p14="http://schemas.microsoft.com/office/powerpoint/2010/main" val="3256369180"/>
       </p:ext>
     </p:extLst>
   </p:cSld>
@@ -16843,7 +16786,7 @@
     </p:spTree>
     <p:extLst>
       <p:ext uri="{BB962C8B-B14F-4D97-AF65-F5344CB8AC3E}">
-        <p14:creationId xmlns:p14="http://schemas.microsoft.com/office/powerpoint/2010/main" xmlns="" val="750497524"/>
+        <p14:creationId xmlns:p14="http://schemas.microsoft.com/office/powerpoint/2010/main" val="750497524"/>
       </p:ext>
     </p:extLst>
   </p:cSld>
@@ -17129,7 +17072,7 @@
     </p:spTree>
     <p:extLst>
       <p:ext uri="{BB962C8B-B14F-4D97-AF65-F5344CB8AC3E}">
-        <p14:creationId xmlns:p14="http://schemas.microsoft.com/office/powerpoint/2010/main" xmlns="" val="4201498520"/>
+        <p14:creationId xmlns:p14="http://schemas.microsoft.com/office/powerpoint/2010/main" val="4201498520"/>
       </p:ext>
     </p:extLst>
   </p:cSld>
@@ -17184,10 +17127,6 @@
               <a:rPr lang="en-CA" dirty="0" err="1"/>
               <a:t>cin</a:t>
             </a:r>
-            <a:r>
-              <a:rPr lang="en-CA" dirty="0"/>
-              <a:t/>
-            </a:r>
             <a:br>
               <a:rPr lang="en-CA" dirty="0"/>
             </a:br>
@@ -17470,7 +17409,7 @@
     </p:spTree>
     <p:extLst>
       <p:ext uri="{BB962C8B-B14F-4D97-AF65-F5344CB8AC3E}">
-        <p14:creationId xmlns:p14="http://schemas.microsoft.com/office/powerpoint/2010/main" xmlns="" val="112235023"/>
+        <p14:creationId xmlns:p14="http://schemas.microsoft.com/office/powerpoint/2010/main" val="112235023"/>
       </p:ext>
     </p:extLst>
   </p:cSld>
@@ -17506,7 +17445,7 @@
           <p:nvPr>
             <p:extLst>
               <p:ext uri="{D42A27DB-BD31-4B8C-83A1-F6EECF244321}">
-                <p14:modId xmlns:p14="http://schemas.microsoft.com/office/powerpoint/2010/main" xmlns="" val="2990306851"/>
+                <p14:modId xmlns:p14="http://schemas.microsoft.com/office/powerpoint/2010/main" val="2990306851"/>
               </p:ext>
             </p:extLst>
           </p:nvPr>
@@ -17525,14 +17464,14 @@
                 <a:gridCol w="2941256">
                   <a:extLst>
                     <a:ext uri="{9D8B030D-6E8A-4147-A177-3AD203B41FA5}">
-                      <a16:colId xmlns:a16="http://schemas.microsoft.com/office/drawing/2014/main" xmlns="" val="2314984316"/>
+                      <a16:colId xmlns:a16="http://schemas.microsoft.com/office/drawing/2014/main" val="2314984316"/>
                     </a:ext>
                   </a:extLst>
                 </a:gridCol>
                 <a:gridCol w="7929944">
                   <a:extLst>
                     <a:ext uri="{9D8B030D-6E8A-4147-A177-3AD203B41FA5}">
-                      <a16:colId xmlns:a16="http://schemas.microsoft.com/office/drawing/2014/main" xmlns="" val="2572730527"/>
+                      <a16:colId xmlns:a16="http://schemas.microsoft.com/office/drawing/2014/main" val="2572730527"/>
                     </a:ext>
                   </a:extLst>
                 </a:gridCol>
@@ -17650,7 +17589,7 @@
                 </a:tc>
                 <a:extLst>
                   <a:ext uri="{0D108BD9-81ED-4DB2-BD59-A6C34878D82A}">
-                    <a16:rowId xmlns:a16="http://schemas.microsoft.com/office/drawing/2014/main" xmlns="" val="658902398"/>
+                    <a16:rowId xmlns:a16="http://schemas.microsoft.com/office/drawing/2014/main" val="658902398"/>
                   </a:ext>
                 </a:extLst>
               </a:tr>
@@ -17779,7 +17718,7 @@
                 </a:tc>
                 <a:extLst>
                   <a:ext uri="{0D108BD9-81ED-4DB2-BD59-A6C34878D82A}">
-                    <a16:rowId xmlns:a16="http://schemas.microsoft.com/office/drawing/2014/main" xmlns="" val="2645949693"/>
+                    <a16:rowId xmlns:a16="http://schemas.microsoft.com/office/drawing/2014/main" val="2645949693"/>
                   </a:ext>
                 </a:extLst>
               </a:tr>
@@ -17938,7 +17877,7 @@
                 </a:tc>
                 <a:extLst>
                   <a:ext uri="{0D108BD9-81ED-4DB2-BD59-A6C34878D82A}">
-                    <a16:rowId xmlns:a16="http://schemas.microsoft.com/office/drawing/2014/main" xmlns="" val="2856633652"/>
+                    <a16:rowId xmlns:a16="http://schemas.microsoft.com/office/drawing/2014/main" val="2856633652"/>
                   </a:ext>
                 </a:extLst>
               </a:tr>
@@ -18021,37 +17960,24 @@
                             <a:schemeClr val="tx1"/>
                           </a:solidFill>
                         </a:rPr>
-                        <a:t>void function copies the contents of s2 to </a:t>
-                      </a:r>
-                      <a:r>
-                        <a:rPr lang="en-US" sz="1600" dirty="0" smtClean="0">
+                        <a:t>void function copies the contents of s2 to s1 (i.e. </a:t>
+                      </a:r>
+                      <a:r>
+                        <a:rPr lang="en-US" sz="1600" u="sng" dirty="0">
                           <a:solidFill>
                             <a:schemeClr val="tx1"/>
                           </a:solidFill>
                         </a:rPr>
-                        <a:t>s1 (i.e. </a:t>
-                      </a:r>
-                      <a:r>
-                        <a:rPr lang="en-US" sz="1600" u="sng" dirty="0" smtClean="0">
+                        <a:t>overwrites</a:t>
+                      </a:r>
+                      <a:r>
+                        <a:rPr lang="en-US" sz="1600" dirty="0">
                           <a:solidFill>
                             <a:schemeClr val="tx1"/>
                           </a:solidFill>
                         </a:rPr>
-                        <a:t>overwrites</a:t>
-                      </a:r>
-                      <a:r>
-                        <a:rPr lang="en-US" sz="1600" dirty="0" smtClean="0">
-                          <a:solidFill>
-                            <a:schemeClr val="tx1"/>
-                          </a:solidFill>
-                        </a:rPr>
                         <a:t> it)</a:t>
                       </a:r>
-                      <a:endParaRPr lang="en-US" sz="1600" dirty="0">
-                        <a:solidFill>
-                          <a:schemeClr val="tx1"/>
-                        </a:solidFill>
-                      </a:endParaRPr>
                     </a:p>
                   </a:txBody>
                   <a:tcPr marL="121920" marR="121920">
@@ -18096,7 +18022,7 @@
                 </a:tc>
                 <a:extLst>
                   <a:ext uri="{0D108BD9-81ED-4DB2-BD59-A6C34878D82A}">
-                    <a16:rowId xmlns:a16="http://schemas.microsoft.com/office/drawing/2014/main" xmlns="" val="3294079903"/>
+                    <a16:rowId xmlns:a16="http://schemas.microsoft.com/office/drawing/2014/main" val="3294079903"/>
                   </a:ext>
                 </a:extLst>
               </a:tr>
@@ -18233,7 +18159,7 @@
                 </a:tc>
                 <a:extLst>
                   <a:ext uri="{0D108BD9-81ED-4DB2-BD59-A6C34878D82A}">
-                    <a16:rowId xmlns:a16="http://schemas.microsoft.com/office/drawing/2014/main" xmlns="" val="3454963082"/>
+                    <a16:rowId xmlns:a16="http://schemas.microsoft.com/office/drawing/2014/main" val="3454963082"/>
                   </a:ext>
                 </a:extLst>
               </a:tr>
@@ -18404,7 +18330,7 @@
                 </a:tc>
                 <a:extLst>
                   <a:ext uri="{0D108BD9-81ED-4DB2-BD59-A6C34878D82A}">
-                    <a16:rowId xmlns:a16="http://schemas.microsoft.com/office/drawing/2014/main" xmlns="" val="2925339162"/>
+                    <a16:rowId xmlns:a16="http://schemas.microsoft.com/office/drawing/2014/main" val="2925339162"/>
                   </a:ext>
                 </a:extLst>
               </a:tr>
@@ -18531,70 +18457,30 @@
                             <a:schemeClr val="tx1"/>
                           </a:solidFill>
                         </a:rPr>
-                        <a:t> is </a:t>
-                      </a:r>
-                      <a:r>
-                        <a:rPr lang="en-US" sz="1600" baseline="0" dirty="0" smtClean="0">
-                          <a:solidFill>
-                            <a:schemeClr val="tx1"/>
-                          </a:solidFill>
-                        </a:rPr>
-                        <a:t>“greater” </a:t>
-                      </a:r>
+                        <a:t> is “greater” than s1, returns a value &lt; 0</a:t>
+                      </a:r>
+                    </a:p>
+                    <a:p>
                       <a:r>
                         <a:rPr lang="en-US" sz="1600" baseline="0" dirty="0">
                           <a:solidFill>
                             <a:schemeClr val="tx1"/>
                           </a:solidFill>
                         </a:rPr>
-                        <a:t>than s1, returns a value &lt; 0</a:t>
+                        <a:t>If s2 is “less” than s1, returns a value &gt; 0</a:t>
                       </a:r>
                     </a:p>
                     <a:p>
                       <a:r>
-                        <a:rPr lang="en-US" sz="1600" baseline="0" dirty="0">
+                        <a:rPr lang="en-CA" sz="1600" dirty="0">
                           <a:solidFill>
                             <a:schemeClr val="tx1"/>
                           </a:solidFill>
                         </a:rPr>
-                        <a:t>If s2 is </a:t>
-                      </a:r>
-                      <a:r>
-                        <a:rPr lang="en-US" sz="1600" baseline="0" dirty="0" smtClean="0">
-                          <a:solidFill>
-                            <a:schemeClr val="tx1"/>
-                          </a:solidFill>
-                        </a:rPr>
-                        <a:t>“less” than </a:t>
+                        <a:t>This is “alphabetically” or “</a:t>
                       </a:r>
                       <a:r>
                         <a:rPr lang="en-US" sz="1600" baseline="0" dirty="0">
-                          <a:solidFill>
-                            <a:schemeClr val="tx1"/>
-                          </a:solidFill>
-                        </a:rPr>
-                        <a:t>s1, returns a value &gt; </a:t>
-                      </a:r>
-                      <a:r>
-                        <a:rPr lang="en-US" sz="1600" baseline="0" dirty="0" smtClean="0">
-                          <a:solidFill>
-                            <a:schemeClr val="tx1"/>
-                          </a:solidFill>
-                        </a:rPr>
-                        <a:t>0</a:t>
-                      </a:r>
-                    </a:p>
-                    <a:p>
-                      <a:r>
-                        <a:rPr lang="en-CA" sz="1600" dirty="0" smtClean="0">
-                          <a:solidFill>
-                            <a:schemeClr val="tx1"/>
-                          </a:solidFill>
-                        </a:rPr>
-                        <a:t>This is “alphabetically” or “</a:t>
-                      </a:r>
-                      <a:r>
-                        <a:rPr lang="en-US" sz="1600" baseline="0" dirty="0" smtClean="0">
                           <a:solidFill>
                             <a:schemeClr val="tx1"/>
                           </a:solidFill>
@@ -18650,7 +18536,7 @@
                 </a:tc>
                 <a:extLst>
                   <a:ext uri="{0D108BD9-81ED-4DB2-BD59-A6C34878D82A}">
-                    <a16:rowId xmlns:a16="http://schemas.microsoft.com/office/drawing/2014/main" xmlns="" val="2902705158"/>
+                    <a16:rowId xmlns:a16="http://schemas.microsoft.com/office/drawing/2014/main" val="2902705158"/>
                   </a:ext>
                 </a:extLst>
               </a:tr>
@@ -18812,7 +18698,7 @@
                 </a:tc>
                 <a:extLst>
                   <a:ext uri="{0D108BD9-81ED-4DB2-BD59-A6C34878D82A}">
-                    <a16:rowId xmlns:a16="http://schemas.microsoft.com/office/drawing/2014/main" xmlns="" val="43197831"/>
+                    <a16:rowId xmlns:a16="http://schemas.microsoft.com/office/drawing/2014/main" val="43197831"/>
                   </a:ext>
                 </a:extLst>
               </a:tr>
@@ -19095,7 +18981,7 @@
     </p:spTree>
     <p:extLst>
       <p:ext uri="{BB962C8B-B14F-4D97-AF65-F5344CB8AC3E}">
-        <p14:creationId xmlns:p14="http://schemas.microsoft.com/office/powerpoint/2010/main" xmlns="" val="3958306964"/>
+        <p14:creationId xmlns:p14="http://schemas.microsoft.com/office/powerpoint/2010/main" val="3958306964"/>
       </p:ext>
     </p:extLst>
   </p:cSld>
@@ -19624,7 +19510,7 @@
     </p:spTree>
     <p:extLst>
       <p:ext uri="{BB962C8B-B14F-4D97-AF65-F5344CB8AC3E}">
-        <p14:creationId xmlns:p14="http://schemas.microsoft.com/office/powerpoint/2010/main" xmlns="" val="671497423"/>
+        <p14:creationId xmlns:p14="http://schemas.microsoft.com/office/powerpoint/2010/main" val="671497423"/>
       </p:ext>
     </p:extLst>
   </p:cSld>
@@ -19932,7 +19818,7 @@
     </p:spTree>
     <p:extLst>
       <p:ext uri="{BB962C8B-B14F-4D97-AF65-F5344CB8AC3E}">
-        <p14:creationId xmlns:p14="http://schemas.microsoft.com/office/powerpoint/2010/main" xmlns="" val="683728673"/>
+        <p14:creationId xmlns:p14="http://schemas.microsoft.com/office/powerpoint/2010/main" val="683728673"/>
       </p:ext>
     </p:extLst>
   </p:cSld>
@@ -20318,7 +20204,7 @@
     </p:spTree>
     <p:extLst>
       <p:ext uri="{BB962C8B-B14F-4D97-AF65-F5344CB8AC3E}">
-        <p14:creationId xmlns:p14="http://schemas.microsoft.com/office/powerpoint/2010/main" xmlns="" val="3707766135"/>
+        <p14:creationId xmlns:p14="http://schemas.microsoft.com/office/powerpoint/2010/main" val="3707766135"/>
       </p:ext>
     </p:extLst>
   </p:cSld>
@@ -20702,7 +20588,7 @@
     </p:spTree>
     <p:extLst>
       <p:ext uri="{BB962C8B-B14F-4D97-AF65-F5344CB8AC3E}">
-        <p14:creationId xmlns:p14="http://schemas.microsoft.com/office/powerpoint/2010/main" xmlns="" val="3320175258"/>
+        <p14:creationId xmlns:p14="http://schemas.microsoft.com/office/powerpoint/2010/main" val="3320175258"/>
       </p:ext>
     </p:extLst>
   </p:cSld>
@@ -21077,7 +20963,7 @@
     </p:spTree>
     <p:extLst>
       <p:ext uri="{BB962C8B-B14F-4D97-AF65-F5344CB8AC3E}">
-        <p14:creationId xmlns:p14="http://schemas.microsoft.com/office/powerpoint/2010/main" xmlns="" val="919824309"/>
+        <p14:creationId xmlns:p14="http://schemas.microsoft.com/office/powerpoint/2010/main" val="919824309"/>
       </p:ext>
     </p:extLst>
   </p:cSld>
@@ -21557,7 +21443,7 @@
     </p:spTree>
     <p:extLst>
       <p:ext uri="{BB962C8B-B14F-4D97-AF65-F5344CB8AC3E}">
-        <p14:creationId xmlns:p14="http://schemas.microsoft.com/office/powerpoint/2010/main" xmlns="" val="2985220655"/>
+        <p14:creationId xmlns:p14="http://schemas.microsoft.com/office/powerpoint/2010/main" val="2985220655"/>
       </p:ext>
     </p:extLst>
   </p:cSld>
@@ -22161,7 +22047,7 @@
     </p:spTree>
     <p:extLst>
       <p:ext uri="{BB962C8B-B14F-4D97-AF65-F5344CB8AC3E}">
-        <p14:creationId xmlns:p14="http://schemas.microsoft.com/office/powerpoint/2010/main" xmlns="" val="1307133091"/>
+        <p14:creationId xmlns:p14="http://schemas.microsoft.com/office/powerpoint/2010/main" val="1307133091"/>
       </p:ext>
     </p:extLst>
   </p:cSld>
@@ -22763,7 +22649,7 @@
     </p:spTree>
     <p:extLst>
       <p:ext uri="{BB962C8B-B14F-4D97-AF65-F5344CB8AC3E}">
-        <p14:creationId xmlns:p14="http://schemas.microsoft.com/office/powerpoint/2010/main" xmlns="" val="2750383660"/>
+        <p14:creationId xmlns:p14="http://schemas.microsoft.com/office/powerpoint/2010/main" val="2750383660"/>
       </p:ext>
     </p:extLst>
   </p:cSld>
@@ -23262,7 +23148,7 @@
     </p:spTree>
     <p:extLst>
       <p:ext uri="{BB962C8B-B14F-4D97-AF65-F5344CB8AC3E}">
-        <p14:creationId xmlns:p14="http://schemas.microsoft.com/office/powerpoint/2010/main" xmlns="" val="3151308694"/>
+        <p14:creationId xmlns:p14="http://schemas.microsoft.com/office/powerpoint/2010/main" val="3151308694"/>
       </p:ext>
     </p:extLst>
   </p:cSld>
@@ -23364,22 +23250,16 @@
             </a:endParaRPr>
           </a:p>
           <a:p>
-            <a:endParaRPr lang="en-CA" sz="2000" b="1" dirty="0" smtClean="0">
+            <a:endParaRPr lang="en-CA" sz="2000" b="1" dirty="0">
               <a:cs typeface="Courier New" panose="02070309020205020404" pitchFamily="49" charset="0"/>
             </a:endParaRPr>
           </a:p>
           <a:p>
             <a:r>
-              <a:rPr lang="en-CA" sz="2000" b="1" dirty="0" smtClean="0">
-                <a:cs typeface="Courier New" panose="02070309020205020404" pitchFamily="49" charset="0"/>
-              </a:rPr>
-              <a:t>How </a:t>
-            </a:r>
-            <a:r>
               <a:rPr lang="en-CA" sz="2000" b="1" dirty="0">
                 <a:cs typeface="Courier New" panose="02070309020205020404" pitchFamily="49" charset="0"/>
               </a:rPr>
-              <a:t>can this erroneous situation be handled?</a:t>
+              <a:t>How can this erroneous situation be handled?</a:t>
             </a:r>
             <a:r>
               <a:rPr lang="en-CA" sz="2000" dirty="0">
@@ -23539,7 +23419,7 @@
     </p:spTree>
     <p:extLst>
       <p:ext uri="{BB962C8B-B14F-4D97-AF65-F5344CB8AC3E}">
-        <p14:creationId xmlns:p14="http://schemas.microsoft.com/office/powerpoint/2010/main" xmlns="" val="3787834020"/>
+        <p14:creationId xmlns:p14="http://schemas.microsoft.com/office/powerpoint/2010/main" val="3787834020"/>
       </p:ext>
     </p:extLst>
   </p:cSld>
@@ -23575,14 +23455,14 @@
           <p:nvPr>
             <p:extLst>
               <p:ext uri="{D42A27DB-BD31-4B8C-83A1-F6EECF244321}">
-                <p14:modId xmlns:p14="http://schemas.microsoft.com/office/powerpoint/2010/main" xmlns="" val="3104833390"/>
+                <p14:modId xmlns:p14="http://schemas.microsoft.com/office/powerpoint/2010/main" val="2336843012"/>
               </p:ext>
             </p:extLst>
           </p:nvPr>
         </p:nvGraphicFramePr>
         <p:xfrm>
           <a:off x="727656" y="3181007"/>
-          <a:ext cx="10871200" cy="2103120"/>
+          <a:ext cx="10612184" cy="2103120"/>
         </p:xfrm>
         <a:graphic>
           <a:graphicData uri="http://schemas.openxmlformats.org/drawingml/2006/table">
@@ -23591,17 +23471,17 @@
                 <a:tableStyleId>{00A15C55-8517-42AA-B614-E9B94910E393}</a:tableStyleId>
               </a:tblPr>
               <a:tblGrid>
-                <a:gridCol w="2941256">
+                <a:gridCol w="2682240">
                   <a:extLst>
                     <a:ext uri="{9D8B030D-6E8A-4147-A177-3AD203B41FA5}">
-                      <a16:colId xmlns:a16="http://schemas.microsoft.com/office/drawing/2014/main" xmlns="" val="2314984316"/>
+                      <a16:colId xmlns:a16="http://schemas.microsoft.com/office/drawing/2014/main" val="2314984316"/>
                     </a:ext>
                   </a:extLst>
                 </a:gridCol>
                 <a:gridCol w="7929944">
                   <a:extLst>
                     <a:ext uri="{9D8B030D-6E8A-4147-A177-3AD203B41FA5}">
-                      <a16:colId xmlns:a16="http://schemas.microsoft.com/office/drawing/2014/main" xmlns="" val="2572730527"/>
+                      <a16:colId xmlns:a16="http://schemas.microsoft.com/office/drawing/2014/main" val="2572730527"/>
                     </a:ext>
                   </a:extLst>
                 </a:gridCol>
@@ -23719,7 +23599,7 @@
                 </a:tc>
                 <a:extLst>
                   <a:ext uri="{0D108BD9-81ED-4DB2-BD59-A6C34878D82A}">
-                    <a16:rowId xmlns:a16="http://schemas.microsoft.com/office/drawing/2014/main" xmlns="" val="658902398"/>
+                    <a16:rowId xmlns:a16="http://schemas.microsoft.com/office/drawing/2014/main" val="658902398"/>
                   </a:ext>
                 </a:extLst>
               </a:tr>
@@ -23866,7 +23746,7 @@
                 </a:tc>
                 <a:extLst>
                   <a:ext uri="{0D108BD9-81ED-4DB2-BD59-A6C34878D82A}">
-                    <a16:rowId xmlns:a16="http://schemas.microsoft.com/office/drawing/2014/main" xmlns="" val="2645949693"/>
+                    <a16:rowId xmlns:a16="http://schemas.microsoft.com/office/drawing/2014/main" val="2645949693"/>
                   </a:ext>
                 </a:extLst>
               </a:tr>
@@ -24021,7 +23901,7 @@
                 </a:tc>
                 <a:extLst>
                   <a:ext uri="{0D108BD9-81ED-4DB2-BD59-A6C34878D82A}">
-                    <a16:rowId xmlns:a16="http://schemas.microsoft.com/office/drawing/2014/main" xmlns="" val="2856633652"/>
+                    <a16:rowId xmlns:a16="http://schemas.microsoft.com/office/drawing/2014/main" val="2856633652"/>
                   </a:ext>
                 </a:extLst>
               </a:tr>
@@ -24032,7 +23912,7 @@
                     <a:lstStyle/>
                     <a:p>
                       <a:r>
-                        <a:rPr lang="en-US" sz="2000" dirty="0" err="1" smtClean="0">
+                        <a:rPr lang="en-US" sz="2000" dirty="0" err="1">
                           <a:solidFill>
                             <a:schemeClr val="tx1"/>
                           </a:solidFill>
@@ -24040,16 +23920,6 @@
                           <a:cs typeface="Courier New" panose="02070309020205020404" pitchFamily="49" charset="0"/>
                         </a:rPr>
                         <a:t>atof</a:t>
-                      </a:r>
-                      <a:r>
-                        <a:rPr lang="en-US" sz="2000" dirty="0" smtClean="0">
-                          <a:solidFill>
-                            <a:schemeClr val="tx1"/>
-                          </a:solidFill>
-                          <a:latin typeface="Courier New" panose="02070309020205020404" pitchFamily="49" charset="0"/>
-                          <a:cs typeface="Courier New" panose="02070309020205020404" pitchFamily="49" charset="0"/>
-                        </a:rPr>
-                        <a:t>(“</a:t>
                       </a:r>
                       <a:r>
                         <a:rPr lang="en-US" sz="2000" dirty="0">
@@ -24059,7 +23929,7 @@
                           <a:latin typeface="Courier New" panose="02070309020205020404" pitchFamily="49" charset="0"/>
                           <a:cs typeface="Courier New" panose="02070309020205020404" pitchFamily="49" charset="0"/>
                         </a:rPr>
-                        <a:t>4567”)</a:t>
+                        <a:t>(“4567”)</a:t>
                       </a:r>
                     </a:p>
                   </a:txBody>
@@ -24125,7 +23995,7 @@
                         <a:t> </a:t>
                       </a:r>
                       <a:r>
-                        <a:rPr lang="en-US" sz="2000" baseline="0" dirty="0" smtClean="0">
+                        <a:rPr lang="en-US" sz="2000" baseline="0" dirty="0">
                           <a:solidFill>
                             <a:schemeClr val="tx1"/>
                           </a:solidFill>
@@ -24135,20 +24005,12 @@
                         <a:t>float </a:t>
                       </a:r>
                       <a:r>
-                        <a:rPr lang="en-US" sz="2000" dirty="0" smtClean="0">
-                          <a:solidFill>
-                            <a:schemeClr val="tx1"/>
-                          </a:solidFill>
-                        </a:rPr>
-                        <a:t>representation </a:t>
-                      </a:r>
-                      <a:r>
                         <a:rPr lang="en-US" sz="2000" dirty="0">
                           <a:solidFill>
                             <a:schemeClr val="tx1"/>
                           </a:solidFill>
                         </a:rPr>
-                        <a:t>of the C-string argument</a:t>
+                        <a:t>representation of the C-string argument</a:t>
                       </a:r>
                     </a:p>
                   </a:txBody>
@@ -24192,6 +24054,11 @@
                     <a:noFill/>
                   </a:tcPr>
                 </a:tc>
+                <a:extLst>
+                  <a:ext uri="{0D108BD9-81ED-4DB2-BD59-A6C34878D82A}">
+                    <a16:rowId xmlns:a16="http://schemas.microsoft.com/office/drawing/2014/main" val="10003"/>
+                  </a:ext>
+                </a:extLst>
               </a:tr>
               <a:tr h="370840">
                 <a:tc>
@@ -24361,7 +24228,7 @@
                 </a:tc>
                 <a:extLst>
                   <a:ext uri="{0D108BD9-81ED-4DB2-BD59-A6C34878D82A}">
-                    <a16:rowId xmlns:a16="http://schemas.microsoft.com/office/drawing/2014/main" xmlns="" val="3294079903"/>
+                    <a16:rowId xmlns:a16="http://schemas.microsoft.com/office/drawing/2014/main" val="3294079903"/>
                   </a:ext>
                 </a:extLst>
               </a:tr>
@@ -24634,54 +24501,31 @@
               <a:rPr lang="en-US" dirty="0"/>
               <a:t>The following C-string functions convert a C-string representation of a number to a numeric data type.  </a:t>
             </a:r>
-            <a:endParaRPr lang="en-US" dirty="0" smtClean="0"/>
-          </a:p>
-          <a:p>
-            <a:r>
-              <a:rPr lang="en-US" dirty="0" smtClean="0"/>
+          </a:p>
+          <a:p>
+            <a:r>
+              <a:rPr lang="en-US" dirty="0"/>
               <a:t>It assumes it </a:t>
             </a:r>
             <a:r>
-              <a:rPr lang="en-US" i="1" dirty="0" smtClean="0"/>
+              <a:rPr lang="en-US" i="1" dirty="0"/>
               <a:t>can </a:t>
             </a:r>
             <a:r>
-              <a:rPr lang="en-US" dirty="0" smtClean="0"/>
+              <a:rPr lang="en-US" dirty="0"/>
               <a:t>be converted to a number (what if it can’t do it? Hmmm… I wonder)</a:t>
             </a:r>
+          </a:p>
+          <a:p>
             <a:endParaRPr lang="en-US" dirty="0"/>
           </a:p>
           <a:p>
-            <a:endParaRPr lang="en-US" dirty="0"/>
-          </a:p>
-          <a:p>
-            <a:r>
-              <a:rPr lang="en-US" sz="1600" dirty="0" err="1">
-                <a:latin typeface="Courier New" panose="02070309020205020404" pitchFamily="49" charset="0"/>
-                <a:cs typeface="Courier New" panose="02070309020205020404" pitchFamily="49" charset="0"/>
-              </a:rPr>
-              <a:t>int</a:t>
-            </a:r>
             <a:r>
               <a:rPr lang="en-US" sz="1600" dirty="0">
                 <a:latin typeface="Courier New" panose="02070309020205020404" pitchFamily="49" charset="0"/>
                 <a:cs typeface="Courier New" panose="02070309020205020404" pitchFamily="49" charset="0"/>
               </a:rPr>
-              <a:t> </a:t>
-            </a:r>
-            <a:r>
-              <a:rPr lang="en-US" sz="1600" dirty="0" err="1">
-                <a:latin typeface="Courier New" panose="02070309020205020404" pitchFamily="49" charset="0"/>
-                <a:cs typeface="Courier New" panose="02070309020205020404" pitchFamily="49" charset="0"/>
-              </a:rPr>
-              <a:t>num</a:t>
-            </a:r>
-            <a:r>
-              <a:rPr lang="en-US" sz="1600" dirty="0">
-                <a:latin typeface="Courier New" panose="02070309020205020404" pitchFamily="49" charset="0"/>
-                <a:cs typeface="Courier New" panose="02070309020205020404" pitchFamily="49" charset="0"/>
-              </a:rPr>
-              <a:t> = </a:t>
+              <a:t>int num = </a:t>
             </a:r>
             <a:r>
               <a:rPr lang="en-US" sz="1600" dirty="0" err="1">
@@ -24779,7 +24623,7 @@
     </p:spTree>
     <p:extLst>
       <p:ext uri="{BB962C8B-B14F-4D97-AF65-F5344CB8AC3E}">
-        <p14:creationId xmlns:p14="http://schemas.microsoft.com/office/powerpoint/2010/main" xmlns="" val="740740963"/>
+        <p14:creationId xmlns:p14="http://schemas.microsoft.com/office/powerpoint/2010/main" val="740740963"/>
       </p:ext>
     </p:extLst>
   </p:cSld>
@@ -24869,7 +24713,7 @@
           <p:nvPr>
             <p:extLst>
               <p:ext uri="{D42A27DB-BD31-4B8C-83A1-F6EECF244321}">
-                <p14:modId xmlns:p14="http://schemas.microsoft.com/office/powerpoint/2010/main" xmlns="" val="2758658603"/>
+                <p14:modId xmlns:p14="http://schemas.microsoft.com/office/powerpoint/2010/main" val="2758658603"/>
               </p:ext>
             </p:extLst>
           </p:nvPr>
@@ -24888,14 +24732,14 @@
                 <a:gridCol w="2844800">
                   <a:extLst>
                     <a:ext uri="{9D8B030D-6E8A-4147-A177-3AD203B41FA5}">
-                      <a16:colId xmlns:a16="http://schemas.microsoft.com/office/drawing/2014/main" xmlns="" val="20000"/>
+                      <a16:colId xmlns:a16="http://schemas.microsoft.com/office/drawing/2014/main" val="20000"/>
                     </a:ext>
                   </a:extLst>
                 </a:gridCol>
                 <a:gridCol w="8331200">
                   <a:extLst>
                     <a:ext uri="{9D8B030D-6E8A-4147-A177-3AD203B41FA5}">
-                      <a16:colId xmlns:a16="http://schemas.microsoft.com/office/drawing/2014/main" xmlns="" val="20001"/>
+                      <a16:colId xmlns:a16="http://schemas.microsoft.com/office/drawing/2014/main" val="20001"/>
                     </a:ext>
                   </a:extLst>
                 </a:gridCol>
@@ -24930,7 +24774,7 @@
                 </a:tc>
                 <a:extLst>
                   <a:ext uri="{0D108BD9-81ED-4DB2-BD59-A6C34878D82A}">
-                    <a16:rowId xmlns:a16="http://schemas.microsoft.com/office/drawing/2014/main" xmlns="" val="10000"/>
+                    <a16:rowId xmlns:a16="http://schemas.microsoft.com/office/drawing/2014/main" val="10000"/>
                   </a:ext>
                 </a:extLst>
               </a:tr>
@@ -25035,7 +24879,7 @@
                 </a:tc>
                 <a:extLst>
                   <a:ext uri="{0D108BD9-81ED-4DB2-BD59-A6C34878D82A}">
-                    <a16:rowId xmlns:a16="http://schemas.microsoft.com/office/drawing/2014/main" xmlns="" val="10001"/>
+                    <a16:rowId xmlns:a16="http://schemas.microsoft.com/office/drawing/2014/main" val="10001"/>
                   </a:ext>
                 </a:extLst>
               </a:tr>
@@ -25151,7 +24995,7 @@
                 </a:tc>
                 <a:extLst>
                   <a:ext uri="{0D108BD9-81ED-4DB2-BD59-A6C34878D82A}">
-                    <a16:rowId xmlns:a16="http://schemas.microsoft.com/office/drawing/2014/main" xmlns="" val="10002"/>
+                    <a16:rowId xmlns:a16="http://schemas.microsoft.com/office/drawing/2014/main" val="10002"/>
                   </a:ext>
                 </a:extLst>
               </a:tr>
@@ -25237,7 +25081,7 @@
                 </a:tc>
                 <a:extLst>
                   <a:ext uri="{0D108BD9-81ED-4DB2-BD59-A6C34878D82A}">
-                    <a16:rowId xmlns:a16="http://schemas.microsoft.com/office/drawing/2014/main" xmlns="" val="1811178312"/>
+                    <a16:rowId xmlns:a16="http://schemas.microsoft.com/office/drawing/2014/main" val="1811178312"/>
                   </a:ext>
                 </a:extLst>
               </a:tr>
@@ -25330,7 +25174,7 @@
                 </a:tc>
                 <a:extLst>
                   <a:ext uri="{0D108BD9-81ED-4DB2-BD59-A6C34878D82A}">
-                    <a16:rowId xmlns:a16="http://schemas.microsoft.com/office/drawing/2014/main" xmlns="" val="10003"/>
+                    <a16:rowId xmlns:a16="http://schemas.microsoft.com/office/drawing/2014/main" val="10003"/>
                   </a:ext>
                 </a:extLst>
               </a:tr>
@@ -25391,7 +25235,7 @@
                 </a:tc>
                 <a:extLst>
                   <a:ext uri="{0D108BD9-81ED-4DB2-BD59-A6C34878D82A}">
-                    <a16:rowId xmlns:a16="http://schemas.microsoft.com/office/drawing/2014/main" xmlns="" val="10004"/>
+                    <a16:rowId xmlns:a16="http://schemas.microsoft.com/office/drawing/2014/main" val="10004"/>
                   </a:ext>
                 </a:extLst>
               </a:tr>
@@ -25445,7 +25289,7 @@
                 </a:tc>
                 <a:extLst>
                   <a:ext uri="{0D108BD9-81ED-4DB2-BD59-A6C34878D82A}">
-                    <a16:rowId xmlns:a16="http://schemas.microsoft.com/office/drawing/2014/main" xmlns="" val="2174151449"/>
+                    <a16:rowId xmlns:a16="http://schemas.microsoft.com/office/drawing/2014/main" val="2174151449"/>
                   </a:ext>
                 </a:extLst>
               </a:tr>
@@ -25456,7 +25300,7 @@
     </p:spTree>
     <p:extLst>
       <p:ext uri="{BB962C8B-B14F-4D97-AF65-F5344CB8AC3E}">
-        <p14:creationId xmlns:p14="http://schemas.microsoft.com/office/powerpoint/2010/main" xmlns="" val="2968752917"/>
+        <p14:creationId xmlns:p14="http://schemas.microsoft.com/office/powerpoint/2010/main" val="2968752917"/>
       </p:ext>
     </p:extLst>
   </p:cSld>
@@ -25787,7 +25631,7 @@
     </p:spTree>
     <p:extLst>
       <p:ext uri="{BB962C8B-B14F-4D97-AF65-F5344CB8AC3E}">
-        <p14:creationId xmlns:p14="http://schemas.microsoft.com/office/powerpoint/2010/main" xmlns="" val="3256369180"/>
+        <p14:creationId xmlns:p14="http://schemas.microsoft.com/office/powerpoint/2010/main" val="3256369180"/>
       </p:ext>
     </p:extLst>
   </p:cSld>
@@ -27048,7 +26892,7 @@
     </p:spTree>
     <p:extLst>
       <p:ext uri="{BB962C8B-B14F-4D97-AF65-F5344CB8AC3E}">
-        <p14:creationId xmlns:p14="http://schemas.microsoft.com/office/powerpoint/2010/main" xmlns="" val="750497524"/>
+        <p14:creationId xmlns:p14="http://schemas.microsoft.com/office/powerpoint/2010/main" val="750497524"/>
       </p:ext>
     </p:extLst>
   </p:cSld>
@@ -27334,7 +27178,7 @@
     </p:spTree>
     <p:extLst>
       <p:ext uri="{BB962C8B-B14F-4D97-AF65-F5344CB8AC3E}">
-        <p14:creationId xmlns:p14="http://schemas.microsoft.com/office/powerpoint/2010/main" xmlns="" val="4201498520"/>
+        <p14:creationId xmlns:p14="http://schemas.microsoft.com/office/powerpoint/2010/main" val="4201498520"/>
       </p:ext>
     </p:extLst>
   </p:cSld>
@@ -27366,7 +27210,7 @@
           <p:cNvPr id="2" name="Title 1">
             <a:extLst>
               <a:ext uri="{FF2B5EF4-FFF2-40B4-BE49-F238E27FC236}">
-                <a16:creationId xmlns:a16="http://schemas.microsoft.com/office/drawing/2014/main" xmlns="" id="{4BF54265-FBFE-4315-AA37-86700B4BA470}"/>
+                <a16:creationId xmlns:a16="http://schemas.microsoft.com/office/drawing/2014/main" id="{4BF54265-FBFE-4315-AA37-86700B4BA470}"/>
               </a:ext>
             </a:extLst>
           </p:cNvPr>
@@ -27388,18 +27232,17 @@
           <a:lstStyle/>
           <a:p>
             <a:r>
-              <a:rPr lang="en-CA" dirty="0" smtClean="0"/>
+              <a:rPr lang="en-CA" dirty="0"/>
               <a:t>Be careful with </a:t>
             </a:r>
             <a:r>
-              <a:rPr lang="en-CA" dirty="0" err="1" smtClean="0"/>
+              <a:rPr lang="en-CA" dirty="0" err="1"/>
               <a:t>atoi</a:t>
             </a:r>
             <a:r>
-              <a:rPr lang="en-CA" dirty="0" smtClean="0"/>
+              <a:rPr lang="en-CA" dirty="0"/>
               <a:t>…</a:t>
             </a:r>
-            <a:endParaRPr lang="en-CA" dirty="0"/>
           </a:p>
         </p:txBody>
       </p:sp>
@@ -27408,7 +27251,7 @@
           <p:cNvPr id="3" name="Content Placeholder 2">
             <a:extLst>
               <a:ext uri="{FF2B5EF4-FFF2-40B4-BE49-F238E27FC236}">
-                <a16:creationId xmlns:a16="http://schemas.microsoft.com/office/drawing/2014/main" xmlns="" id="{A513B2C6-BA11-4A9F-98B9-BCC4E6BC7134}"/>
+                <a16:creationId xmlns:a16="http://schemas.microsoft.com/office/drawing/2014/main" id="{A513B2C6-BA11-4A9F-98B9-BCC4E6BC7134}"/>
               </a:ext>
             </a:extLst>
           </p:cNvPr>
@@ -27430,41 +27273,26 @@
           <a:lstStyle/>
           <a:p>
             <a:r>
-              <a:rPr lang="en-CA" dirty="0" err="1" smtClean="0"/>
+              <a:rPr lang="en-CA" dirty="0" err="1"/>
               <a:t>atoi</a:t>
             </a:r>
             <a:r>
-              <a:rPr lang="en-CA" dirty="0" smtClean="0"/>
+              <a:rPr lang="en-CA" dirty="0"/>
               <a:t> is pretty “old school” and doesn’t handle thing</a:t>
             </a:r>
-            <a:endParaRPr lang="en-CA" dirty="0"/>
           </a:p>
           <a:p>
             <a:r>
               <a:rPr lang="en-CA" dirty="0"/>
               <a:t>They return 0 when the number can’t be converted.  </a:t>
             </a:r>
-            <a:endParaRPr lang="en-CA" dirty="0" smtClean="0"/>
           </a:p>
           <a:p>
             <a:pPr lvl="1"/>
             <a:r>
-              <a:rPr lang="en-CA" dirty="0" smtClean="0"/>
-              <a:t>So </a:t>
-            </a:r>
-            <a:r>
               <a:rPr lang="en-CA" dirty="0"/>
-              <a:t>reading “0” looks like an error</a:t>
-            </a:r>
-            <a:r>
-              <a:rPr lang="en-CA" dirty="0" smtClean="0"/>
-              <a:t>. </a:t>
-            </a:r>
-            <a:r>
-              <a:rPr lang="en-CA" dirty="0" smtClean="0"/>
-              <a:t>Like </a:t>
-            </a:r>
-            <a:endParaRPr lang="en-CA" dirty="0"/>
+              <a:t>So reading “0” looks like an error. Like </a:t>
+            </a:r>
           </a:p>
           <a:p>
             <a:r>
@@ -27512,21 +27340,20 @@
               <a:t>or </a:t>
             </a:r>
             <a:r>
-              <a:rPr lang="en-CA" dirty="0" err="1" smtClean="0"/>
+              <a:rPr lang="en-CA" dirty="0" err="1"/>
               <a:t>stringstreams</a:t>
             </a:r>
             <a:r>
-              <a:rPr lang="en-CA" dirty="0" smtClean="0"/>
+              <a:rPr lang="en-CA" dirty="0"/>
               <a:t> (the Best Way)</a:t>
             </a:r>
-            <a:endParaRPr lang="en-CA" dirty="0"/>
           </a:p>
         </p:txBody>
       </p:sp>
     </p:spTree>
     <p:extLst>
       <p:ext uri="{BB962C8B-B14F-4D97-AF65-F5344CB8AC3E}">
-        <p14:creationId xmlns:p14="http://schemas.microsoft.com/office/powerpoint/2010/main" xmlns="" val="2088027851"/>
+        <p14:creationId xmlns:p14="http://schemas.microsoft.com/office/powerpoint/2010/main" val="2088027851"/>
       </p:ext>
     </p:extLst>
   </p:cSld>
@@ -27608,7 +27435,7 @@
           <p:nvPr>
             <p:extLst>
               <p:ext uri="{D42A27DB-BD31-4B8C-83A1-F6EECF244321}">
-                <p14:modId xmlns:p14="http://schemas.microsoft.com/office/powerpoint/2010/main" xmlns="" val="292929894"/>
+                <p14:modId xmlns:p14="http://schemas.microsoft.com/office/powerpoint/2010/main" val="292929894"/>
               </p:ext>
             </p:extLst>
           </p:nvPr>
@@ -27627,14 +27454,14 @@
                 <a:gridCol w="2690891">
                   <a:extLst>
                     <a:ext uri="{9D8B030D-6E8A-4147-A177-3AD203B41FA5}">
-                      <a16:colId xmlns:a16="http://schemas.microsoft.com/office/drawing/2014/main" xmlns="" val="2314984316"/>
+                      <a16:colId xmlns:a16="http://schemas.microsoft.com/office/drawing/2014/main" val="2314984316"/>
                     </a:ext>
                   </a:extLst>
                 </a:gridCol>
                 <a:gridCol w="8180309">
                   <a:extLst>
                     <a:ext uri="{9D8B030D-6E8A-4147-A177-3AD203B41FA5}">
-                      <a16:colId xmlns:a16="http://schemas.microsoft.com/office/drawing/2014/main" xmlns="" val="2572730527"/>
+                      <a16:colId xmlns:a16="http://schemas.microsoft.com/office/drawing/2014/main" val="2572730527"/>
                     </a:ext>
                   </a:extLst>
                 </a:gridCol>
@@ -27752,7 +27579,7 @@
                 </a:tc>
                 <a:extLst>
                   <a:ext uri="{0D108BD9-81ED-4DB2-BD59-A6C34878D82A}">
-                    <a16:rowId xmlns:a16="http://schemas.microsoft.com/office/drawing/2014/main" xmlns="" val="658902398"/>
+                    <a16:rowId xmlns:a16="http://schemas.microsoft.com/office/drawing/2014/main" val="658902398"/>
                   </a:ext>
                 </a:extLst>
               </a:tr>
@@ -27944,7 +27771,7 @@
                 </a:tc>
                 <a:extLst>
                   <a:ext uri="{0D108BD9-81ED-4DB2-BD59-A6C34878D82A}">
-                    <a16:rowId xmlns:a16="http://schemas.microsoft.com/office/drawing/2014/main" xmlns="" val="2645949693"/>
+                    <a16:rowId xmlns:a16="http://schemas.microsoft.com/office/drawing/2014/main" val="2645949693"/>
                   </a:ext>
                 </a:extLst>
               </a:tr>
@@ -28153,7 +27980,7 @@
                 </a:tc>
                 <a:extLst>
                   <a:ext uri="{0D108BD9-81ED-4DB2-BD59-A6C34878D82A}">
-                    <a16:rowId xmlns:a16="http://schemas.microsoft.com/office/drawing/2014/main" xmlns="" val="2856633652"/>
+                    <a16:rowId xmlns:a16="http://schemas.microsoft.com/office/drawing/2014/main" val="2856633652"/>
                   </a:ext>
                 </a:extLst>
               </a:tr>
@@ -28320,7 +28147,7 @@
                 </a:tc>
                 <a:extLst>
                   <a:ext uri="{0D108BD9-81ED-4DB2-BD59-A6C34878D82A}">
-                    <a16:rowId xmlns:a16="http://schemas.microsoft.com/office/drawing/2014/main" xmlns="" val="3294079903"/>
+                    <a16:rowId xmlns:a16="http://schemas.microsoft.com/office/drawing/2014/main" val="3294079903"/>
                   </a:ext>
                 </a:extLst>
               </a:tr>
@@ -28500,7 +28327,7 @@
                 </a:tc>
                 <a:extLst>
                   <a:ext uri="{0D108BD9-81ED-4DB2-BD59-A6C34878D82A}">
-                    <a16:rowId xmlns:a16="http://schemas.microsoft.com/office/drawing/2014/main" xmlns="" val="3454963082"/>
+                    <a16:rowId xmlns:a16="http://schemas.microsoft.com/office/drawing/2014/main" val="3454963082"/>
                   </a:ext>
                 </a:extLst>
               </a:tr>
@@ -28689,7 +28516,7 @@
                 </a:tc>
                 <a:extLst>
                   <a:ext uri="{0D108BD9-81ED-4DB2-BD59-A6C34878D82A}">
-                    <a16:rowId xmlns:a16="http://schemas.microsoft.com/office/drawing/2014/main" xmlns="" val="2902705158"/>
+                    <a16:rowId xmlns:a16="http://schemas.microsoft.com/office/drawing/2014/main" val="2902705158"/>
                   </a:ext>
                 </a:extLst>
               </a:tr>
@@ -28856,7 +28683,7 @@
                 </a:tc>
                 <a:extLst>
                   <a:ext uri="{0D108BD9-81ED-4DB2-BD59-A6C34878D82A}">
-                    <a16:rowId xmlns:a16="http://schemas.microsoft.com/office/drawing/2014/main" xmlns="" val="43197831"/>
+                    <a16:rowId xmlns:a16="http://schemas.microsoft.com/office/drawing/2014/main" val="43197831"/>
                   </a:ext>
                 </a:extLst>
               </a:tr>
@@ -29064,7 +28891,7 @@
                 </a:tc>
                 <a:extLst>
                   <a:ext uri="{0D108BD9-81ED-4DB2-BD59-A6C34878D82A}">
-                    <a16:rowId xmlns:a16="http://schemas.microsoft.com/office/drawing/2014/main" xmlns="" val="3380003541"/>
+                    <a16:rowId xmlns:a16="http://schemas.microsoft.com/office/drawing/2014/main" val="3380003541"/>
                   </a:ext>
                 </a:extLst>
               </a:tr>
@@ -29244,7 +29071,7 @@
                 </a:tc>
                 <a:extLst>
                   <a:ext uri="{0D108BD9-81ED-4DB2-BD59-A6C34878D82A}">
-                    <a16:rowId xmlns:a16="http://schemas.microsoft.com/office/drawing/2014/main" xmlns="" val="1782402169"/>
+                    <a16:rowId xmlns:a16="http://schemas.microsoft.com/office/drawing/2014/main" val="1782402169"/>
                   </a:ext>
                 </a:extLst>
               </a:tr>
@@ -29411,7 +29238,7 @@
                 </a:tc>
                 <a:extLst>
                   <a:ext uri="{0D108BD9-81ED-4DB2-BD59-A6C34878D82A}">
-                    <a16:rowId xmlns:a16="http://schemas.microsoft.com/office/drawing/2014/main" xmlns="" val="798850122"/>
+                    <a16:rowId xmlns:a16="http://schemas.microsoft.com/office/drawing/2014/main" val="798850122"/>
                   </a:ext>
                 </a:extLst>
               </a:tr>
@@ -29493,7 +29320,7 @@
     </p:spTree>
     <p:extLst>
       <p:ext uri="{BB962C8B-B14F-4D97-AF65-F5344CB8AC3E}">
-        <p14:creationId xmlns:p14="http://schemas.microsoft.com/office/powerpoint/2010/main" xmlns="" val="3355740982"/>
+        <p14:creationId xmlns:p14="http://schemas.microsoft.com/office/powerpoint/2010/main" val="3355740982"/>
       </p:ext>
     </p:extLst>
   </p:cSld>
@@ -29795,7 +29622,7 @@
     </p:spTree>
     <p:extLst>
       <p:ext uri="{BB962C8B-B14F-4D97-AF65-F5344CB8AC3E}">
-        <p14:creationId xmlns:p14="http://schemas.microsoft.com/office/powerpoint/2010/main" xmlns="" val="463387468"/>
+        <p14:creationId xmlns:p14="http://schemas.microsoft.com/office/powerpoint/2010/main" val="463387468"/>
       </p:ext>
     </p:extLst>
   </p:cSld>
@@ -29855,7 +29682,7 @@
           <p:nvPr>
             <p:extLst>
               <p:ext uri="{D42A27DB-BD31-4B8C-83A1-F6EECF244321}">
-                <p14:modId xmlns:p14="http://schemas.microsoft.com/office/powerpoint/2010/main" xmlns="" val="1590376896"/>
+                <p14:modId xmlns:p14="http://schemas.microsoft.com/office/powerpoint/2010/main" val="1590376896"/>
               </p:ext>
             </p:extLst>
           </p:nvPr>
@@ -29874,14 +29701,14 @@
                 <a:gridCol w="3352800">
                   <a:extLst>
                     <a:ext uri="{9D8B030D-6E8A-4147-A177-3AD203B41FA5}">
-                      <a16:colId xmlns:a16="http://schemas.microsoft.com/office/drawing/2014/main" xmlns="" val="2314984316"/>
+                      <a16:colId xmlns:a16="http://schemas.microsoft.com/office/drawing/2014/main" val="2314984316"/>
                     </a:ext>
                   </a:extLst>
                 </a:gridCol>
                 <a:gridCol w="7518400">
                   <a:extLst>
                     <a:ext uri="{9D8B030D-6E8A-4147-A177-3AD203B41FA5}">
-                      <a16:colId xmlns:a16="http://schemas.microsoft.com/office/drawing/2014/main" xmlns="" val="2572730527"/>
+                      <a16:colId xmlns:a16="http://schemas.microsoft.com/office/drawing/2014/main" val="2572730527"/>
                     </a:ext>
                   </a:extLst>
                 </a:gridCol>
@@ -29999,7 +29826,7 @@
                 </a:tc>
                 <a:extLst>
                   <a:ext uri="{0D108BD9-81ED-4DB2-BD59-A6C34878D82A}">
-                    <a16:rowId xmlns:a16="http://schemas.microsoft.com/office/drawing/2014/main" xmlns="" val="658902398"/>
+                    <a16:rowId xmlns:a16="http://schemas.microsoft.com/office/drawing/2014/main" val="658902398"/>
                   </a:ext>
                 </a:extLst>
               </a:tr>
@@ -30272,7 +30099,7 @@
                 </a:tc>
                 <a:extLst>
                   <a:ext uri="{0D108BD9-81ED-4DB2-BD59-A6C34878D82A}">
-                    <a16:rowId xmlns:a16="http://schemas.microsoft.com/office/drawing/2014/main" xmlns="" val="2645949693"/>
+                    <a16:rowId xmlns:a16="http://schemas.microsoft.com/office/drawing/2014/main" val="2645949693"/>
                   </a:ext>
                 </a:extLst>
               </a:tr>
@@ -30611,7 +30438,7 @@
                 </a:tc>
                 <a:extLst>
                   <a:ext uri="{0D108BD9-81ED-4DB2-BD59-A6C34878D82A}">
-                    <a16:rowId xmlns:a16="http://schemas.microsoft.com/office/drawing/2014/main" xmlns="" val="2856633652"/>
+                    <a16:rowId xmlns:a16="http://schemas.microsoft.com/office/drawing/2014/main" val="2856633652"/>
                   </a:ext>
                 </a:extLst>
               </a:tr>
@@ -30743,7 +30570,7 @@
                 </a:tc>
                 <a:extLst>
                   <a:ext uri="{0D108BD9-81ED-4DB2-BD59-A6C34878D82A}">
-                    <a16:rowId xmlns:a16="http://schemas.microsoft.com/office/drawing/2014/main" xmlns="" val="3294079903"/>
+                    <a16:rowId xmlns:a16="http://schemas.microsoft.com/office/drawing/2014/main" val="3294079903"/>
                   </a:ext>
                 </a:extLst>
               </a:tr>
@@ -30917,7 +30744,7 @@
                 </a:tc>
                 <a:extLst>
                   <a:ext uri="{0D108BD9-81ED-4DB2-BD59-A6C34878D82A}">
-                    <a16:rowId xmlns:a16="http://schemas.microsoft.com/office/drawing/2014/main" xmlns="" val="3454963082"/>
+                    <a16:rowId xmlns:a16="http://schemas.microsoft.com/office/drawing/2014/main" val="3454963082"/>
                   </a:ext>
                 </a:extLst>
               </a:tr>
@@ -31091,7 +30918,7 @@
                 </a:tc>
                 <a:extLst>
                   <a:ext uri="{0D108BD9-81ED-4DB2-BD59-A6C34878D82A}">
-                    <a16:rowId xmlns:a16="http://schemas.microsoft.com/office/drawing/2014/main" xmlns="" val="2925339162"/>
+                    <a16:rowId xmlns:a16="http://schemas.microsoft.com/office/drawing/2014/main" val="2925339162"/>
                   </a:ext>
                 </a:extLst>
               </a:tr>
@@ -31220,7 +31047,7 @@
                 </a:tc>
                 <a:extLst>
                   <a:ext uri="{0D108BD9-81ED-4DB2-BD59-A6C34878D82A}">
-                    <a16:rowId xmlns:a16="http://schemas.microsoft.com/office/drawing/2014/main" xmlns="" val="2902705158"/>
+                    <a16:rowId xmlns:a16="http://schemas.microsoft.com/office/drawing/2014/main" val="2902705158"/>
                   </a:ext>
                 </a:extLst>
               </a:tr>
@@ -31426,7 +31253,7 @@
                 </a:tc>
                 <a:extLst>
                   <a:ext uri="{0D108BD9-81ED-4DB2-BD59-A6C34878D82A}">
-                    <a16:rowId xmlns:a16="http://schemas.microsoft.com/office/drawing/2014/main" xmlns="" val="1924395125"/>
+                    <a16:rowId xmlns:a16="http://schemas.microsoft.com/office/drawing/2014/main" val="1924395125"/>
                   </a:ext>
                 </a:extLst>
               </a:tr>
@@ -31690,7 +31517,7 @@
                 </a:tc>
                 <a:extLst>
                   <a:ext uri="{0D108BD9-81ED-4DB2-BD59-A6C34878D82A}">
-                    <a16:rowId xmlns:a16="http://schemas.microsoft.com/office/drawing/2014/main" xmlns="" val="97978955"/>
+                    <a16:rowId xmlns:a16="http://schemas.microsoft.com/office/drawing/2014/main" val="97978955"/>
                   </a:ext>
                 </a:extLst>
               </a:tr>
@@ -31742,7 +31569,7 @@
     </p:spTree>
     <p:extLst>
       <p:ext uri="{BB962C8B-B14F-4D97-AF65-F5344CB8AC3E}">
-        <p14:creationId xmlns:p14="http://schemas.microsoft.com/office/powerpoint/2010/main" xmlns="" val="1098712927"/>
+        <p14:creationId xmlns:p14="http://schemas.microsoft.com/office/powerpoint/2010/main" val="1098712927"/>
       </p:ext>
     </p:extLst>
   </p:cSld>
@@ -31802,7 +31629,7 @@
           <p:nvPr>
             <p:extLst>
               <p:ext uri="{D42A27DB-BD31-4B8C-83A1-F6EECF244321}">
-                <p14:modId xmlns:p14="http://schemas.microsoft.com/office/powerpoint/2010/main" xmlns="" val="4180551743"/>
+                <p14:modId xmlns:p14="http://schemas.microsoft.com/office/powerpoint/2010/main" val="4180551743"/>
               </p:ext>
             </p:extLst>
           </p:nvPr>
@@ -31821,14 +31648,14 @@
                 <a:gridCol w="3321465">
                   <a:extLst>
                     <a:ext uri="{9D8B030D-6E8A-4147-A177-3AD203B41FA5}">
-                      <a16:colId xmlns:a16="http://schemas.microsoft.com/office/drawing/2014/main" xmlns="" val="2314984316"/>
+                      <a16:colId xmlns:a16="http://schemas.microsoft.com/office/drawing/2014/main" val="2314984316"/>
                     </a:ext>
                   </a:extLst>
                 </a:gridCol>
                 <a:gridCol w="7448135">
                   <a:extLst>
                     <a:ext uri="{9D8B030D-6E8A-4147-A177-3AD203B41FA5}">
-                      <a16:colId xmlns:a16="http://schemas.microsoft.com/office/drawing/2014/main" xmlns="" val="2572730527"/>
+                      <a16:colId xmlns:a16="http://schemas.microsoft.com/office/drawing/2014/main" val="2572730527"/>
                     </a:ext>
                   </a:extLst>
                 </a:gridCol>
@@ -31946,7 +31773,7 @@
                 </a:tc>
                 <a:extLst>
                   <a:ext uri="{0D108BD9-81ED-4DB2-BD59-A6C34878D82A}">
-                    <a16:rowId xmlns:a16="http://schemas.microsoft.com/office/drawing/2014/main" xmlns="" val="658902398"/>
+                    <a16:rowId xmlns:a16="http://schemas.microsoft.com/office/drawing/2014/main" val="658902398"/>
                   </a:ext>
                 </a:extLst>
               </a:tr>
@@ -32116,7 +31943,7 @@
                 </a:tc>
                 <a:extLst>
                   <a:ext uri="{0D108BD9-81ED-4DB2-BD59-A6C34878D82A}">
-                    <a16:rowId xmlns:a16="http://schemas.microsoft.com/office/drawing/2014/main" xmlns="" val="2645949693"/>
+                    <a16:rowId xmlns:a16="http://schemas.microsoft.com/office/drawing/2014/main" val="2645949693"/>
                   </a:ext>
                 </a:extLst>
               </a:tr>
@@ -32426,7 +32253,7 @@
                 </a:tc>
                 <a:extLst>
                   <a:ext uri="{0D108BD9-81ED-4DB2-BD59-A6C34878D82A}">
-                    <a16:rowId xmlns:a16="http://schemas.microsoft.com/office/drawing/2014/main" xmlns="" val="2856633652"/>
+                    <a16:rowId xmlns:a16="http://schemas.microsoft.com/office/drawing/2014/main" val="2856633652"/>
                   </a:ext>
                 </a:extLst>
               </a:tr>
@@ -32673,7 +32500,7 @@
                 </a:tc>
                 <a:extLst>
                   <a:ext uri="{0D108BD9-81ED-4DB2-BD59-A6C34878D82A}">
-                    <a16:rowId xmlns:a16="http://schemas.microsoft.com/office/drawing/2014/main" xmlns="" val="3294079903"/>
+                    <a16:rowId xmlns:a16="http://schemas.microsoft.com/office/drawing/2014/main" val="3294079903"/>
                   </a:ext>
                 </a:extLst>
               </a:tr>
@@ -32883,7 +32710,7 @@
                 </a:tc>
                 <a:extLst>
                   <a:ext uri="{0D108BD9-81ED-4DB2-BD59-A6C34878D82A}">
-                    <a16:rowId xmlns:a16="http://schemas.microsoft.com/office/drawing/2014/main" xmlns="" val="3454963082"/>
+                    <a16:rowId xmlns:a16="http://schemas.microsoft.com/office/drawing/2014/main" val="3454963082"/>
                   </a:ext>
                 </a:extLst>
               </a:tr>
@@ -33053,7 +32880,7 @@
                 </a:tc>
                 <a:extLst>
                   <a:ext uri="{0D108BD9-81ED-4DB2-BD59-A6C34878D82A}">
-                    <a16:rowId xmlns:a16="http://schemas.microsoft.com/office/drawing/2014/main" xmlns="" val="2925339162"/>
+                    <a16:rowId xmlns:a16="http://schemas.microsoft.com/office/drawing/2014/main" val="2925339162"/>
                   </a:ext>
                 </a:extLst>
               </a:tr>
@@ -33182,7 +33009,7 @@
                 </a:tc>
                 <a:extLst>
                   <a:ext uri="{0D108BD9-81ED-4DB2-BD59-A6C34878D82A}">
-                    <a16:rowId xmlns:a16="http://schemas.microsoft.com/office/drawing/2014/main" xmlns="" val="2902705158"/>
+                    <a16:rowId xmlns:a16="http://schemas.microsoft.com/office/drawing/2014/main" val="2902705158"/>
                   </a:ext>
                 </a:extLst>
               </a:tr>
@@ -33352,7 +33179,7 @@
                 </a:tc>
                 <a:extLst>
                   <a:ext uri="{0D108BD9-81ED-4DB2-BD59-A6C34878D82A}">
-                    <a16:rowId xmlns:a16="http://schemas.microsoft.com/office/drawing/2014/main" xmlns="" val="43197831"/>
+                    <a16:rowId xmlns:a16="http://schemas.microsoft.com/office/drawing/2014/main" val="43197831"/>
                   </a:ext>
                 </a:extLst>
               </a:tr>
@@ -33494,7 +33321,7 @@
                 </a:tc>
                 <a:extLst>
                   <a:ext uri="{0D108BD9-81ED-4DB2-BD59-A6C34878D82A}">
-                    <a16:rowId xmlns:a16="http://schemas.microsoft.com/office/drawing/2014/main" xmlns="" val="345649045"/>
+                    <a16:rowId xmlns:a16="http://schemas.microsoft.com/office/drawing/2014/main" val="345649045"/>
                   </a:ext>
                 </a:extLst>
               </a:tr>
@@ -33543,7 +33370,7 @@
     </p:spTree>
     <p:extLst>
       <p:ext uri="{BB962C8B-B14F-4D97-AF65-F5344CB8AC3E}">
-        <p14:creationId xmlns:p14="http://schemas.microsoft.com/office/powerpoint/2010/main" xmlns="" val="863366742"/>
+        <p14:creationId xmlns:p14="http://schemas.microsoft.com/office/powerpoint/2010/main" val="863366742"/>
       </p:ext>
     </p:extLst>
   </p:cSld>
@@ -33808,7 +33635,7 @@
   <a:extraClrSchemeLst/>
   <a:extLst>
     <a:ext uri="{05A4C25C-085E-4340-85A3-A5531E510DB2}">
-      <thm15:themeFamily xmlns="" xmlns:thm15="http://schemas.microsoft.com/office/thememl/2012/main" name="Office Theme" id="{62F939B6-93AF-4DB8-9C6B-D6C7DFDC589F}" vid="{4F46216B-77A9-411A-B9D3-5023FCB70208}"/>
+      <thm15:themeFamily xmlns:thm15="http://schemas.microsoft.com/office/thememl/2012/main" name="Office Theme" id="{62F939B6-93AF-4DB8-9C6B-D6C7DFDC589F}" vid="{4F46216B-77A9-411A-B9D3-5023FCB70208}"/>
     </a:ext>
   </a:extLst>
 </a:theme>

</xml_diff>